<commit_message>
work done in class to finish instructions and test cases
</commit_message>
<xml_diff>
--- a/Microarchitecture.pptx
+++ b/Microarchitecture.pptx
@@ -111,7 +111,7 @@
   </p:defaultTextStyle>
   <p:extLst>
     <p:ext uri="{EFAFB233-063F-42B5-8137-9DF3F51BA10A}">
-      <p15:sldGuideLst xmlns:p15="http://schemas.microsoft.com/office/powerpoint/2012/main">
+      <p15:sldGuideLst xmlns:p15="http://schemas.microsoft.com/office/powerpoint/2012/main" xmlns="">
         <p15:guide id="1" orient="horz" pos="2160">
           <p15:clr>
             <a:srgbClr val="A4A3A4"/>
@@ -309,7 +309,7 @@
           <a:p>
             <a:fld id="{267D5C1A-8198-4C2A-9AE2-AA2B1DDE4025}" type="datetimeFigureOut">
               <a:rPr lang="en-US" smtClean="0"/>
-              <a:t>2/12/2018</a:t>
+              <a:t>3/6/2018</a:t>
             </a:fld>
             <a:endParaRPr lang="en-US"/>
           </a:p>
@@ -479,7 +479,7 @@
           <a:p>
             <a:fld id="{267D5C1A-8198-4C2A-9AE2-AA2B1DDE4025}" type="datetimeFigureOut">
               <a:rPr lang="en-US" smtClean="0"/>
-              <a:t>2/12/2018</a:t>
+              <a:t>3/6/2018</a:t>
             </a:fld>
             <a:endParaRPr lang="en-US"/>
           </a:p>
@@ -659,7 +659,7 @@
           <a:p>
             <a:fld id="{267D5C1A-8198-4C2A-9AE2-AA2B1DDE4025}" type="datetimeFigureOut">
               <a:rPr lang="en-US" smtClean="0"/>
-              <a:t>2/12/2018</a:t>
+              <a:t>3/6/2018</a:t>
             </a:fld>
             <a:endParaRPr lang="en-US"/>
           </a:p>
@@ -829,7 +829,7 @@
           <a:p>
             <a:fld id="{267D5C1A-8198-4C2A-9AE2-AA2B1DDE4025}" type="datetimeFigureOut">
               <a:rPr lang="en-US" smtClean="0"/>
-              <a:t>2/12/2018</a:t>
+              <a:t>3/6/2018</a:t>
             </a:fld>
             <a:endParaRPr lang="en-US"/>
           </a:p>
@@ -1075,7 +1075,7 @@
           <a:p>
             <a:fld id="{267D5C1A-8198-4C2A-9AE2-AA2B1DDE4025}" type="datetimeFigureOut">
               <a:rPr lang="en-US" smtClean="0"/>
-              <a:t>2/12/2018</a:t>
+              <a:t>3/6/2018</a:t>
             </a:fld>
             <a:endParaRPr lang="en-US"/>
           </a:p>
@@ -1363,7 +1363,7 @@
           <a:p>
             <a:fld id="{267D5C1A-8198-4C2A-9AE2-AA2B1DDE4025}" type="datetimeFigureOut">
               <a:rPr lang="en-US" smtClean="0"/>
-              <a:t>2/12/2018</a:t>
+              <a:t>3/6/2018</a:t>
             </a:fld>
             <a:endParaRPr lang="en-US"/>
           </a:p>
@@ -1785,7 +1785,7 @@
           <a:p>
             <a:fld id="{267D5C1A-8198-4C2A-9AE2-AA2B1DDE4025}" type="datetimeFigureOut">
               <a:rPr lang="en-US" smtClean="0"/>
-              <a:t>2/12/2018</a:t>
+              <a:t>3/6/2018</a:t>
             </a:fld>
             <a:endParaRPr lang="en-US"/>
           </a:p>
@@ -1903,7 +1903,7 @@
           <a:p>
             <a:fld id="{267D5C1A-8198-4C2A-9AE2-AA2B1DDE4025}" type="datetimeFigureOut">
               <a:rPr lang="en-US" smtClean="0"/>
-              <a:t>2/12/2018</a:t>
+              <a:t>3/6/2018</a:t>
             </a:fld>
             <a:endParaRPr lang="en-US"/>
           </a:p>
@@ -1998,7 +1998,7 @@
           <a:p>
             <a:fld id="{267D5C1A-8198-4C2A-9AE2-AA2B1DDE4025}" type="datetimeFigureOut">
               <a:rPr lang="en-US" smtClean="0"/>
-              <a:t>2/12/2018</a:t>
+              <a:t>3/6/2018</a:t>
             </a:fld>
             <a:endParaRPr lang="en-US"/>
           </a:p>
@@ -2275,7 +2275,7 @@
           <a:p>
             <a:fld id="{267D5C1A-8198-4C2A-9AE2-AA2B1DDE4025}" type="datetimeFigureOut">
               <a:rPr lang="en-US" smtClean="0"/>
-              <a:t>2/12/2018</a:t>
+              <a:t>3/6/2018</a:t>
             </a:fld>
             <a:endParaRPr lang="en-US"/>
           </a:p>
@@ -2528,7 +2528,7 @@
           <a:p>
             <a:fld id="{267D5C1A-8198-4C2A-9AE2-AA2B1DDE4025}" type="datetimeFigureOut">
               <a:rPr lang="en-US" smtClean="0"/>
-              <a:t>2/12/2018</a:t>
+              <a:t>3/6/2018</a:t>
             </a:fld>
             <a:endParaRPr lang="en-US"/>
           </a:p>
@@ -2741,7 +2741,7 @@
           <a:p>
             <a:fld id="{267D5C1A-8198-4C2A-9AE2-AA2B1DDE4025}" type="datetimeFigureOut">
               <a:rPr lang="en-US" smtClean="0"/>
-              <a:t>2/12/2018</a:t>
+              <a:t>3/6/2018</a:t>
             </a:fld>
             <a:endParaRPr lang="en-US"/>
           </a:p>
@@ -7558,28 +7558,28 @@
                 <a:gridCol w="1295400">
                   <a:extLst>
                     <a:ext uri="{9D8B030D-6E8A-4147-A177-3AD203B41FA5}">
-                      <a16:colId xmlns:a16="http://schemas.microsoft.com/office/drawing/2014/main" val="20000"/>
+                      <a16:colId xmlns:a16="http://schemas.microsoft.com/office/drawing/2014/main" xmlns="" val="20000"/>
                     </a:ext>
                   </a:extLst>
                 </a:gridCol>
                 <a:gridCol w="1295400">
                   <a:extLst>
                     <a:ext uri="{9D8B030D-6E8A-4147-A177-3AD203B41FA5}">
-                      <a16:colId xmlns:a16="http://schemas.microsoft.com/office/drawing/2014/main" val="20001"/>
+                      <a16:colId xmlns:a16="http://schemas.microsoft.com/office/drawing/2014/main" xmlns="" val="20001"/>
                     </a:ext>
                   </a:extLst>
                 </a:gridCol>
                 <a:gridCol w="1977391">
                   <a:extLst>
                     <a:ext uri="{9D8B030D-6E8A-4147-A177-3AD203B41FA5}">
-                      <a16:colId xmlns:a16="http://schemas.microsoft.com/office/drawing/2014/main" val="20002"/>
+                      <a16:colId xmlns:a16="http://schemas.microsoft.com/office/drawing/2014/main" xmlns="" val="20002"/>
                     </a:ext>
                   </a:extLst>
                 </a:gridCol>
                 <a:gridCol w="3737610">
                   <a:extLst>
                     <a:ext uri="{9D8B030D-6E8A-4147-A177-3AD203B41FA5}">
-                      <a16:colId xmlns:a16="http://schemas.microsoft.com/office/drawing/2014/main" val="20003"/>
+                      <a16:colId xmlns:a16="http://schemas.microsoft.com/office/drawing/2014/main" xmlns="" val="20003"/>
                     </a:ext>
                   </a:extLst>
                 </a:gridCol>
@@ -7643,7 +7643,7 @@
                 </a:tc>
                 <a:extLst>
                   <a:ext uri="{0D108BD9-81ED-4DB2-BD59-A6C34878D82A}">
-                    <a16:rowId xmlns:a16="http://schemas.microsoft.com/office/drawing/2014/main" val="10000"/>
+                    <a16:rowId xmlns:a16="http://schemas.microsoft.com/office/drawing/2014/main" xmlns="" val="10000"/>
                   </a:ext>
                 </a:extLst>
               </a:tr>
@@ -7710,7 +7710,7 @@
                 </a:tc>
                 <a:extLst>
                   <a:ext uri="{0D108BD9-81ED-4DB2-BD59-A6C34878D82A}">
-                    <a16:rowId xmlns:a16="http://schemas.microsoft.com/office/drawing/2014/main" val="10001"/>
+                    <a16:rowId xmlns:a16="http://schemas.microsoft.com/office/drawing/2014/main" xmlns="" val="10001"/>
                   </a:ext>
                 </a:extLst>
               </a:tr>
@@ -7773,7 +7773,7 @@
                 </a:tc>
                 <a:extLst>
                   <a:ext uri="{0D108BD9-81ED-4DB2-BD59-A6C34878D82A}">
-                    <a16:rowId xmlns:a16="http://schemas.microsoft.com/office/drawing/2014/main" val="10002"/>
+                    <a16:rowId xmlns:a16="http://schemas.microsoft.com/office/drawing/2014/main" xmlns="" val="10002"/>
                   </a:ext>
                 </a:extLst>
               </a:tr>
@@ -7840,7 +7840,7 @@
                 </a:tc>
                 <a:extLst>
                   <a:ext uri="{0D108BD9-81ED-4DB2-BD59-A6C34878D82A}">
-                    <a16:rowId xmlns:a16="http://schemas.microsoft.com/office/drawing/2014/main" val="10003"/>
+                    <a16:rowId xmlns:a16="http://schemas.microsoft.com/office/drawing/2014/main" xmlns="" val="10003"/>
                   </a:ext>
                 </a:extLst>
               </a:tr>
@@ -7907,7 +7907,7 @@
                 </a:tc>
                 <a:extLst>
                   <a:ext uri="{0D108BD9-81ED-4DB2-BD59-A6C34878D82A}">
-                    <a16:rowId xmlns:a16="http://schemas.microsoft.com/office/drawing/2014/main" val="10004"/>
+                    <a16:rowId xmlns:a16="http://schemas.microsoft.com/office/drawing/2014/main" xmlns="" val="10004"/>
                   </a:ext>
                 </a:extLst>
               </a:tr>
@@ -7974,7 +7974,7 @@
                 </a:tc>
                 <a:extLst>
                   <a:ext uri="{0D108BD9-81ED-4DB2-BD59-A6C34878D82A}">
-                    <a16:rowId xmlns:a16="http://schemas.microsoft.com/office/drawing/2014/main" val="10005"/>
+                    <a16:rowId xmlns:a16="http://schemas.microsoft.com/office/drawing/2014/main" xmlns="" val="10005"/>
                   </a:ext>
                 </a:extLst>
               </a:tr>
@@ -8041,7 +8041,7 @@
                 </a:tc>
                 <a:extLst>
                   <a:ext uri="{0D108BD9-81ED-4DB2-BD59-A6C34878D82A}">
-                    <a16:rowId xmlns:a16="http://schemas.microsoft.com/office/drawing/2014/main" val="10006"/>
+                    <a16:rowId xmlns:a16="http://schemas.microsoft.com/office/drawing/2014/main" xmlns="" val="10006"/>
                   </a:ext>
                 </a:extLst>
               </a:tr>
@@ -8111,7 +8111,7 @@
                 </a:tc>
                 <a:extLst>
                   <a:ext uri="{0D108BD9-81ED-4DB2-BD59-A6C34878D82A}">
-                    <a16:rowId xmlns:a16="http://schemas.microsoft.com/office/drawing/2014/main" val="10007"/>
+                    <a16:rowId xmlns:a16="http://schemas.microsoft.com/office/drawing/2014/main" xmlns="" val="10007"/>
                   </a:ext>
                 </a:extLst>
               </a:tr>
@@ -8173,7 +8173,7 @@
                 </a:tc>
                 <a:extLst>
                   <a:ext uri="{0D108BD9-81ED-4DB2-BD59-A6C34878D82A}">
-                    <a16:rowId xmlns:a16="http://schemas.microsoft.com/office/drawing/2014/main" val="10008"/>
+                    <a16:rowId xmlns:a16="http://schemas.microsoft.com/office/drawing/2014/main" xmlns="" val="10008"/>
                   </a:ext>
                 </a:extLst>
               </a:tr>
@@ -8235,7 +8235,7 @@
                 </a:tc>
                 <a:extLst>
                   <a:ext uri="{0D108BD9-81ED-4DB2-BD59-A6C34878D82A}">
-                    <a16:rowId xmlns:a16="http://schemas.microsoft.com/office/drawing/2014/main" val="10009"/>
+                    <a16:rowId xmlns:a16="http://schemas.microsoft.com/office/drawing/2014/main" xmlns="" val="10009"/>
                   </a:ext>
                 </a:extLst>
               </a:tr>
@@ -8297,7 +8297,7 @@
                 </a:tc>
                 <a:extLst>
                   <a:ext uri="{0D108BD9-81ED-4DB2-BD59-A6C34878D82A}">
-                    <a16:rowId xmlns:a16="http://schemas.microsoft.com/office/drawing/2014/main" val="10010"/>
+                    <a16:rowId xmlns:a16="http://schemas.microsoft.com/office/drawing/2014/main" xmlns="" val="10010"/>
                   </a:ext>
                 </a:extLst>
               </a:tr>
@@ -8359,7 +8359,7 @@
                 </a:tc>
                 <a:extLst>
                   <a:ext uri="{0D108BD9-81ED-4DB2-BD59-A6C34878D82A}">
-                    <a16:rowId xmlns:a16="http://schemas.microsoft.com/office/drawing/2014/main" val="10011"/>
+                    <a16:rowId xmlns:a16="http://schemas.microsoft.com/office/drawing/2014/main" xmlns="" val="10011"/>
                   </a:ext>
                 </a:extLst>
               </a:tr>
@@ -8421,7 +8421,7 @@
                 </a:tc>
                 <a:extLst>
                   <a:ext uri="{0D108BD9-81ED-4DB2-BD59-A6C34878D82A}">
-                    <a16:rowId xmlns:a16="http://schemas.microsoft.com/office/drawing/2014/main" val="10012"/>
+                    <a16:rowId xmlns:a16="http://schemas.microsoft.com/office/drawing/2014/main" xmlns="" val="10012"/>
                   </a:ext>
                 </a:extLst>
               </a:tr>
@@ -8483,7 +8483,7 @@
                 </a:tc>
                 <a:extLst>
                   <a:ext uri="{0D108BD9-81ED-4DB2-BD59-A6C34878D82A}">
-                    <a16:rowId xmlns:a16="http://schemas.microsoft.com/office/drawing/2014/main" val="10013"/>
+                    <a16:rowId xmlns:a16="http://schemas.microsoft.com/office/drawing/2014/main" xmlns="" val="10013"/>
                   </a:ext>
                 </a:extLst>
               </a:tr>
@@ -8549,7 +8549,7 @@
                 </a:tc>
                 <a:extLst>
                   <a:ext uri="{0D108BD9-81ED-4DB2-BD59-A6C34878D82A}">
-                    <a16:rowId xmlns:a16="http://schemas.microsoft.com/office/drawing/2014/main" val="10014"/>
+                    <a16:rowId xmlns:a16="http://schemas.microsoft.com/office/drawing/2014/main" xmlns="" val="10014"/>
                   </a:ext>
                 </a:extLst>
               </a:tr>
@@ -8611,7 +8611,7 @@
                 </a:tc>
                 <a:extLst>
                   <a:ext uri="{0D108BD9-81ED-4DB2-BD59-A6C34878D82A}">
-                    <a16:rowId xmlns:a16="http://schemas.microsoft.com/office/drawing/2014/main" val="10015"/>
+                    <a16:rowId xmlns:a16="http://schemas.microsoft.com/office/drawing/2014/main" xmlns="" val="10015"/>
                   </a:ext>
                 </a:extLst>
               </a:tr>
@@ -8673,7 +8673,7 @@
                 </a:tc>
                 <a:extLst>
                   <a:ext uri="{0D108BD9-81ED-4DB2-BD59-A6C34878D82A}">
-                    <a16:rowId xmlns:a16="http://schemas.microsoft.com/office/drawing/2014/main" val="10016"/>
+                    <a16:rowId xmlns:a16="http://schemas.microsoft.com/office/drawing/2014/main" xmlns="" val="10016"/>
                   </a:ext>
                 </a:extLst>
               </a:tr>
@@ -8727,7 +8727,7 @@
           <p:nvPr>
             <p:extLst>
               <p:ext uri="{D42A27DB-BD31-4B8C-83A1-F6EECF244321}">
-                <p14:modId xmlns:p14="http://schemas.microsoft.com/office/powerpoint/2010/main" val="1124328358"/>
+                <p14:modId xmlns:p14="http://schemas.microsoft.com/office/powerpoint/2010/main" val="4073778697"/>
               </p:ext>
             </p:extLst>
           </p:nvPr>
@@ -8746,28 +8746,28 @@
                 <a:gridCol w="1295400">
                   <a:extLst>
                     <a:ext uri="{9D8B030D-6E8A-4147-A177-3AD203B41FA5}">
-                      <a16:colId xmlns:a16="http://schemas.microsoft.com/office/drawing/2014/main" val="20000"/>
+                      <a16:colId xmlns:a16="http://schemas.microsoft.com/office/drawing/2014/main" xmlns="" val="20000"/>
                     </a:ext>
                   </a:extLst>
                 </a:gridCol>
                 <a:gridCol w="1295400">
                   <a:extLst>
                     <a:ext uri="{9D8B030D-6E8A-4147-A177-3AD203B41FA5}">
-                      <a16:colId xmlns:a16="http://schemas.microsoft.com/office/drawing/2014/main" val="20001"/>
+                      <a16:colId xmlns:a16="http://schemas.microsoft.com/office/drawing/2014/main" xmlns="" val="20001"/>
                     </a:ext>
                   </a:extLst>
                 </a:gridCol>
                 <a:gridCol w="2133600">
                   <a:extLst>
                     <a:ext uri="{9D8B030D-6E8A-4147-A177-3AD203B41FA5}">
-                      <a16:colId xmlns:a16="http://schemas.microsoft.com/office/drawing/2014/main" val="20002"/>
+                      <a16:colId xmlns:a16="http://schemas.microsoft.com/office/drawing/2014/main" xmlns="" val="20002"/>
                     </a:ext>
                   </a:extLst>
                 </a:gridCol>
                 <a:gridCol w="3581401">
                   <a:extLst>
                     <a:ext uri="{9D8B030D-6E8A-4147-A177-3AD203B41FA5}">
-                      <a16:colId xmlns:a16="http://schemas.microsoft.com/office/drawing/2014/main" val="20003"/>
+                      <a16:colId xmlns:a16="http://schemas.microsoft.com/office/drawing/2014/main" xmlns="" val="20003"/>
                     </a:ext>
                   </a:extLst>
                 </a:gridCol>
@@ -8831,7 +8831,7 @@
                 </a:tc>
                 <a:extLst>
                   <a:ext uri="{0D108BD9-81ED-4DB2-BD59-A6C34878D82A}">
-                    <a16:rowId xmlns:a16="http://schemas.microsoft.com/office/drawing/2014/main" val="10000"/>
+                    <a16:rowId xmlns:a16="http://schemas.microsoft.com/office/drawing/2014/main" xmlns="" val="10000"/>
                   </a:ext>
                 </a:extLst>
               </a:tr>
@@ -8898,7 +8898,7 @@
                 </a:tc>
                 <a:extLst>
                   <a:ext uri="{0D108BD9-81ED-4DB2-BD59-A6C34878D82A}">
-                    <a16:rowId xmlns:a16="http://schemas.microsoft.com/office/drawing/2014/main" val="10001"/>
+                    <a16:rowId xmlns:a16="http://schemas.microsoft.com/office/drawing/2014/main" xmlns="" val="10001"/>
                   </a:ext>
                 </a:extLst>
               </a:tr>
@@ -8961,7 +8961,7 @@
                 </a:tc>
                 <a:extLst>
                   <a:ext uri="{0D108BD9-81ED-4DB2-BD59-A6C34878D82A}">
-                    <a16:rowId xmlns:a16="http://schemas.microsoft.com/office/drawing/2014/main" val="10002"/>
+                    <a16:rowId xmlns:a16="http://schemas.microsoft.com/office/drawing/2014/main" xmlns="" val="10002"/>
                   </a:ext>
                 </a:extLst>
               </a:tr>
@@ -9024,7 +9024,7 @@
                 </a:tc>
                 <a:extLst>
                   <a:ext uri="{0D108BD9-81ED-4DB2-BD59-A6C34878D82A}">
-                    <a16:rowId xmlns:a16="http://schemas.microsoft.com/office/drawing/2014/main" val="10003"/>
+                    <a16:rowId xmlns:a16="http://schemas.microsoft.com/office/drawing/2014/main" xmlns="" val="10003"/>
                   </a:ext>
                 </a:extLst>
               </a:tr>
@@ -9087,7 +9087,7 @@
                 </a:tc>
                 <a:extLst>
                   <a:ext uri="{0D108BD9-81ED-4DB2-BD59-A6C34878D82A}">
-                    <a16:rowId xmlns:a16="http://schemas.microsoft.com/office/drawing/2014/main" val="10004"/>
+                    <a16:rowId xmlns:a16="http://schemas.microsoft.com/office/drawing/2014/main" xmlns="" val="10004"/>
                   </a:ext>
                 </a:extLst>
               </a:tr>
@@ -9150,7 +9150,7 @@
                 </a:tc>
                 <a:extLst>
                   <a:ext uri="{0D108BD9-81ED-4DB2-BD59-A6C34878D82A}">
-                    <a16:rowId xmlns:a16="http://schemas.microsoft.com/office/drawing/2014/main" val="10005"/>
+                    <a16:rowId xmlns:a16="http://schemas.microsoft.com/office/drawing/2014/main" xmlns="" val="10005"/>
                   </a:ext>
                 </a:extLst>
               </a:tr>
@@ -9213,7 +9213,7 @@
                 </a:tc>
                 <a:extLst>
                   <a:ext uri="{0D108BD9-81ED-4DB2-BD59-A6C34878D82A}">
-                    <a16:rowId xmlns:a16="http://schemas.microsoft.com/office/drawing/2014/main" val="10006"/>
+                    <a16:rowId xmlns:a16="http://schemas.microsoft.com/office/drawing/2014/main" xmlns="" val="10006"/>
                   </a:ext>
                 </a:extLst>
               </a:tr>
@@ -9275,7 +9275,7 @@
                 </a:tc>
                 <a:extLst>
                   <a:ext uri="{0D108BD9-81ED-4DB2-BD59-A6C34878D82A}">
-                    <a16:rowId xmlns:a16="http://schemas.microsoft.com/office/drawing/2014/main" val="10007"/>
+                    <a16:rowId xmlns:a16="http://schemas.microsoft.com/office/drawing/2014/main" xmlns="" val="10007"/>
                   </a:ext>
                 </a:extLst>
               </a:tr>
@@ -9337,7 +9337,7 @@
                 </a:tc>
                 <a:extLst>
                   <a:ext uri="{0D108BD9-81ED-4DB2-BD59-A6C34878D82A}">
-                    <a16:rowId xmlns:a16="http://schemas.microsoft.com/office/drawing/2014/main" val="10008"/>
+                    <a16:rowId xmlns:a16="http://schemas.microsoft.com/office/drawing/2014/main" xmlns="" val="10008"/>
                   </a:ext>
                 </a:extLst>
               </a:tr>
@@ -9403,7 +9403,7 @@
                 </a:tc>
                 <a:extLst>
                   <a:ext uri="{0D108BD9-81ED-4DB2-BD59-A6C34878D82A}">
-                    <a16:rowId xmlns:a16="http://schemas.microsoft.com/office/drawing/2014/main" val="10009"/>
+                    <a16:rowId xmlns:a16="http://schemas.microsoft.com/office/drawing/2014/main" xmlns="" val="10009"/>
                   </a:ext>
                 </a:extLst>
               </a:tr>
@@ -9465,7 +9465,7 @@
                 </a:tc>
                 <a:extLst>
                   <a:ext uri="{0D108BD9-81ED-4DB2-BD59-A6C34878D82A}">
-                    <a16:rowId xmlns:a16="http://schemas.microsoft.com/office/drawing/2014/main" val="10010"/>
+                    <a16:rowId xmlns:a16="http://schemas.microsoft.com/office/drawing/2014/main" xmlns="" val="10010"/>
                   </a:ext>
                 </a:extLst>
               </a:tr>
@@ -9527,7 +9527,7 @@
                 </a:tc>
                 <a:extLst>
                   <a:ext uri="{0D108BD9-81ED-4DB2-BD59-A6C34878D82A}">
-                    <a16:rowId xmlns:a16="http://schemas.microsoft.com/office/drawing/2014/main" val="10011"/>
+                    <a16:rowId xmlns:a16="http://schemas.microsoft.com/office/drawing/2014/main" xmlns="" val="10011"/>
                   </a:ext>
                 </a:extLst>
               </a:tr>
@@ -9589,7 +9589,7 @@
                 </a:tc>
                 <a:extLst>
                   <a:ext uri="{0D108BD9-81ED-4DB2-BD59-A6C34878D82A}">
-                    <a16:rowId xmlns:a16="http://schemas.microsoft.com/office/drawing/2014/main" val="10012"/>
+                    <a16:rowId xmlns:a16="http://schemas.microsoft.com/office/drawing/2014/main" xmlns="" val="10012"/>
                   </a:ext>
                 </a:extLst>
               </a:tr>
@@ -9615,7 +9615,7 @@
                     <a:p>
                       <a:r>
                         <a:rPr lang="en-US" sz="1400" dirty="0" smtClean="0"/>
-                        <a:t>SCMP</a:t>
+                        <a:t>SCMP X</a:t>
                       </a:r>
                       <a:endParaRPr lang="en-US" sz="1400" dirty="0"/>
                     </a:p>
@@ -9643,7 +9643,11 @@
                     <a:p>
                       <a:r>
                         <a:rPr lang="en-US" sz="1400" baseline="0" dirty="0" smtClean="0"/>
-                        <a:t>TMP=MEM[SP++];AC=-1|0|1</a:t>
+                        <a:t>TMP=AC-MEM[X];</a:t>
+                      </a:r>
+                      <a:r>
+                        <a:rPr lang="en-US" sz="1400" baseline="0" dirty="0" smtClean="0"/>
+                        <a:t>AC=-1|0|1</a:t>
                       </a:r>
                     </a:p>
                   </a:txBody>
@@ -9651,7 +9655,7 @@
                 </a:tc>
                 <a:extLst>
                   <a:ext uri="{0D108BD9-81ED-4DB2-BD59-A6C34878D82A}">
-                    <a16:rowId xmlns:a16="http://schemas.microsoft.com/office/drawing/2014/main" val="10013"/>
+                    <a16:rowId xmlns:a16="http://schemas.microsoft.com/office/drawing/2014/main" xmlns="" val="10013"/>
                   </a:ext>
                 </a:extLst>
               </a:tr>
@@ -9677,7 +9681,7 @@
                     <a:p>
                       <a:r>
                         <a:rPr lang="en-US" sz="1400" dirty="0" smtClean="0"/>
-                        <a:t>UCMP</a:t>
+                        <a:t>UCMP X</a:t>
                       </a:r>
                       <a:endParaRPr lang="en-US" sz="1400" dirty="0"/>
                     </a:p>
@@ -9703,14 +9707,34 @@
                     <a:bodyPr/>
                     <a:lstStyle/>
                     <a:p>
-                      <a:endParaRPr lang="en-US" sz="1400" baseline="0" dirty="0" smtClean="0"/>
+                      <a:pPr marL="0" marR="0" indent="0" algn="l" defTabSz="914400" rtl="0" eaLnBrk="1" fontAlgn="auto" latinLnBrk="0" hangingPunct="1">
+                        <a:lnSpc>
+                          <a:spcPct val="100000"/>
+                        </a:lnSpc>
+                        <a:spcBef>
+                          <a:spcPts val="0"/>
+                        </a:spcBef>
+                        <a:spcAft>
+                          <a:spcPts val="0"/>
+                        </a:spcAft>
+                        <a:buClrTx/>
+                        <a:buSzTx/>
+                        <a:buFontTx/>
+                        <a:buNone/>
+                        <a:tabLst/>
+                        <a:defRPr/>
+                      </a:pPr>
+                      <a:r>
+                        <a:rPr lang="en-US" sz="1400" baseline="0" smtClean="0"/>
+                        <a:t>TMP=AC-MEM[X];AC=-1|0|1</a:t>
+                      </a:r>
                     </a:p>
                   </a:txBody>
                   <a:tcPr/>
                 </a:tc>
                 <a:extLst>
                   <a:ext uri="{0D108BD9-81ED-4DB2-BD59-A6C34878D82A}">
-                    <a16:rowId xmlns:a16="http://schemas.microsoft.com/office/drawing/2014/main" val="10014"/>
+                    <a16:rowId xmlns:a16="http://schemas.microsoft.com/office/drawing/2014/main" xmlns="" val="10014"/>
                   </a:ext>
                 </a:extLst>
               </a:tr>
@@ -9772,7 +9796,7 @@
                 </a:tc>
                 <a:extLst>
                   <a:ext uri="{0D108BD9-81ED-4DB2-BD59-A6C34878D82A}">
-                    <a16:rowId xmlns:a16="http://schemas.microsoft.com/office/drawing/2014/main" val="10015"/>
+                    <a16:rowId xmlns:a16="http://schemas.microsoft.com/office/drawing/2014/main" xmlns="" val="10015"/>
                   </a:ext>
                 </a:extLst>
               </a:tr>
@@ -9834,7 +9858,7 @@
                 </a:tc>
                 <a:extLst>
                   <a:ext uri="{0D108BD9-81ED-4DB2-BD59-A6C34878D82A}">
-                    <a16:rowId xmlns:a16="http://schemas.microsoft.com/office/drawing/2014/main" val="785209088"/>
+                    <a16:rowId xmlns:a16="http://schemas.microsoft.com/office/drawing/2014/main" xmlns="" val="785209088"/>
                   </a:ext>
                 </a:extLst>
               </a:tr>
@@ -9907,28 +9931,28 @@
                 <a:gridCol w="1295400">
                   <a:extLst>
                     <a:ext uri="{9D8B030D-6E8A-4147-A177-3AD203B41FA5}">
-                      <a16:colId xmlns:a16="http://schemas.microsoft.com/office/drawing/2014/main" val="20000"/>
+                      <a16:colId xmlns:a16="http://schemas.microsoft.com/office/drawing/2014/main" xmlns="" val="20000"/>
                     </a:ext>
                   </a:extLst>
                 </a:gridCol>
                 <a:gridCol w="1295400">
                   <a:extLst>
                     <a:ext uri="{9D8B030D-6E8A-4147-A177-3AD203B41FA5}">
-                      <a16:colId xmlns:a16="http://schemas.microsoft.com/office/drawing/2014/main" val="20001"/>
+                      <a16:colId xmlns:a16="http://schemas.microsoft.com/office/drawing/2014/main" xmlns="" val="20001"/>
                     </a:ext>
                   </a:extLst>
                 </a:gridCol>
                 <a:gridCol w="2133600">
                   <a:extLst>
                     <a:ext uri="{9D8B030D-6E8A-4147-A177-3AD203B41FA5}">
-                      <a16:colId xmlns:a16="http://schemas.microsoft.com/office/drawing/2014/main" val="20002"/>
+                      <a16:colId xmlns:a16="http://schemas.microsoft.com/office/drawing/2014/main" xmlns="" val="20002"/>
                     </a:ext>
                   </a:extLst>
                 </a:gridCol>
                 <a:gridCol w="3581401">
                   <a:extLst>
                     <a:ext uri="{9D8B030D-6E8A-4147-A177-3AD203B41FA5}">
-                      <a16:colId xmlns:a16="http://schemas.microsoft.com/office/drawing/2014/main" val="20003"/>
+                      <a16:colId xmlns:a16="http://schemas.microsoft.com/office/drawing/2014/main" xmlns="" val="20003"/>
                     </a:ext>
                   </a:extLst>
                 </a:gridCol>
@@ -9992,7 +10016,7 @@
                 </a:tc>
                 <a:extLst>
                   <a:ext uri="{0D108BD9-81ED-4DB2-BD59-A6C34878D82A}">
-                    <a16:rowId xmlns:a16="http://schemas.microsoft.com/office/drawing/2014/main" val="10000"/>
+                    <a16:rowId xmlns:a16="http://schemas.microsoft.com/office/drawing/2014/main" xmlns="" val="10000"/>
                   </a:ext>
                 </a:extLst>
               </a:tr>
@@ -10063,7 +10087,7 @@
                 </a:tc>
                 <a:extLst>
                   <a:ext uri="{0D108BD9-81ED-4DB2-BD59-A6C34878D82A}">
-                    <a16:rowId xmlns:a16="http://schemas.microsoft.com/office/drawing/2014/main" val="10001"/>
+                    <a16:rowId xmlns:a16="http://schemas.microsoft.com/office/drawing/2014/main" xmlns="" val="10001"/>
                   </a:ext>
                 </a:extLst>
               </a:tr>
@@ -10126,7 +10150,7 @@
                 </a:tc>
                 <a:extLst>
                   <a:ext uri="{0D108BD9-81ED-4DB2-BD59-A6C34878D82A}">
-                    <a16:rowId xmlns:a16="http://schemas.microsoft.com/office/drawing/2014/main" val="10002"/>
+                    <a16:rowId xmlns:a16="http://schemas.microsoft.com/office/drawing/2014/main" xmlns="" val="10002"/>
                   </a:ext>
                 </a:extLst>
               </a:tr>
@@ -10193,7 +10217,7 @@
                 </a:tc>
                 <a:extLst>
                   <a:ext uri="{0D108BD9-81ED-4DB2-BD59-A6C34878D82A}">
-                    <a16:rowId xmlns:a16="http://schemas.microsoft.com/office/drawing/2014/main" val="10003"/>
+                    <a16:rowId xmlns:a16="http://schemas.microsoft.com/office/drawing/2014/main" xmlns="" val="10003"/>
                   </a:ext>
                 </a:extLst>
               </a:tr>
@@ -10256,7 +10280,7 @@
                 </a:tc>
                 <a:extLst>
                   <a:ext uri="{0D108BD9-81ED-4DB2-BD59-A6C34878D82A}">
-                    <a16:rowId xmlns:a16="http://schemas.microsoft.com/office/drawing/2014/main" val="10004"/>
+                    <a16:rowId xmlns:a16="http://schemas.microsoft.com/office/drawing/2014/main" xmlns="" val="10004"/>
                   </a:ext>
                 </a:extLst>
               </a:tr>
@@ -10319,7 +10343,7 @@
                 </a:tc>
                 <a:extLst>
                   <a:ext uri="{0D108BD9-81ED-4DB2-BD59-A6C34878D82A}">
-                    <a16:rowId xmlns:a16="http://schemas.microsoft.com/office/drawing/2014/main" val="10005"/>
+                    <a16:rowId xmlns:a16="http://schemas.microsoft.com/office/drawing/2014/main" xmlns="" val="10005"/>
                   </a:ext>
                 </a:extLst>
               </a:tr>
@@ -10382,7 +10406,7 @@
                 </a:tc>
                 <a:extLst>
                   <a:ext uri="{0D108BD9-81ED-4DB2-BD59-A6C34878D82A}">
-                    <a16:rowId xmlns:a16="http://schemas.microsoft.com/office/drawing/2014/main" val="10006"/>
+                    <a16:rowId xmlns:a16="http://schemas.microsoft.com/office/drawing/2014/main" xmlns="" val="10006"/>
                   </a:ext>
                 </a:extLst>
               </a:tr>
@@ -10445,7 +10469,7 @@
                 </a:tc>
                 <a:extLst>
                   <a:ext uri="{0D108BD9-81ED-4DB2-BD59-A6C34878D82A}">
-                    <a16:rowId xmlns:a16="http://schemas.microsoft.com/office/drawing/2014/main" val="10007"/>
+                    <a16:rowId xmlns:a16="http://schemas.microsoft.com/office/drawing/2014/main" xmlns="" val="10007"/>
                   </a:ext>
                 </a:extLst>
               </a:tr>
@@ -10512,7 +10536,7 @@
                 </a:tc>
                 <a:extLst>
                   <a:ext uri="{0D108BD9-81ED-4DB2-BD59-A6C34878D82A}">
-                    <a16:rowId xmlns:a16="http://schemas.microsoft.com/office/drawing/2014/main" val="10008"/>
+                    <a16:rowId xmlns:a16="http://schemas.microsoft.com/office/drawing/2014/main" xmlns="" val="10008"/>
                   </a:ext>
                 </a:extLst>
               </a:tr>
@@ -10575,7 +10599,7 @@
                 </a:tc>
                 <a:extLst>
                   <a:ext uri="{0D108BD9-81ED-4DB2-BD59-A6C34878D82A}">
-                    <a16:rowId xmlns:a16="http://schemas.microsoft.com/office/drawing/2014/main" val="10009"/>
+                    <a16:rowId xmlns:a16="http://schemas.microsoft.com/office/drawing/2014/main" xmlns="" val="10009"/>
                   </a:ext>
                 </a:extLst>
               </a:tr>
@@ -10638,7 +10662,7 @@
                 </a:tc>
                 <a:extLst>
                   <a:ext uri="{0D108BD9-81ED-4DB2-BD59-A6C34878D82A}">
-                    <a16:rowId xmlns:a16="http://schemas.microsoft.com/office/drawing/2014/main" val="10010"/>
+                    <a16:rowId xmlns:a16="http://schemas.microsoft.com/office/drawing/2014/main" xmlns="" val="10010"/>
                   </a:ext>
                 </a:extLst>
               </a:tr>
@@ -10701,7 +10725,7 @@
                 </a:tc>
                 <a:extLst>
                   <a:ext uri="{0D108BD9-81ED-4DB2-BD59-A6C34878D82A}">
-                    <a16:rowId xmlns:a16="http://schemas.microsoft.com/office/drawing/2014/main" val="10011"/>
+                    <a16:rowId xmlns:a16="http://schemas.microsoft.com/office/drawing/2014/main" xmlns="" val="10011"/>
                   </a:ext>
                 </a:extLst>
               </a:tr>
@@ -10768,7 +10792,7 @@
                 </a:tc>
                 <a:extLst>
                   <a:ext uri="{0D108BD9-81ED-4DB2-BD59-A6C34878D82A}">
-                    <a16:rowId xmlns:a16="http://schemas.microsoft.com/office/drawing/2014/main" val="10012"/>
+                    <a16:rowId xmlns:a16="http://schemas.microsoft.com/office/drawing/2014/main" xmlns="" val="10012"/>
                   </a:ext>
                 </a:extLst>
               </a:tr>
@@ -10839,7 +10863,7 @@
                 </a:tc>
                 <a:extLst>
                   <a:ext uri="{0D108BD9-81ED-4DB2-BD59-A6C34878D82A}">
-                    <a16:rowId xmlns:a16="http://schemas.microsoft.com/office/drawing/2014/main" val="10013"/>
+                    <a16:rowId xmlns:a16="http://schemas.microsoft.com/office/drawing/2014/main" xmlns="" val="10013"/>
                   </a:ext>
                 </a:extLst>
               </a:tr>
@@ -10906,7 +10930,7 @@
                 </a:tc>
                 <a:extLst>
                   <a:ext uri="{0D108BD9-81ED-4DB2-BD59-A6C34878D82A}">
-                    <a16:rowId xmlns:a16="http://schemas.microsoft.com/office/drawing/2014/main" val="10014"/>
+                    <a16:rowId xmlns:a16="http://schemas.microsoft.com/office/drawing/2014/main" xmlns="" val="10014"/>
                   </a:ext>
                 </a:extLst>
               </a:tr>
@@ -10962,14 +10986,13 @@
                         <a:rPr lang="en-US" sz="1400" baseline="0" dirty="0" smtClean="0"/>
                         <a:t>BP=MEM[BP]</a:t>
                       </a:r>
-                      <a:endParaRPr lang="en-US" sz="1400" baseline="0" dirty="0" smtClean="0"/>
                     </a:p>
                   </a:txBody>
                   <a:tcPr/>
                 </a:tc>
                 <a:extLst>
                   <a:ext uri="{0D108BD9-81ED-4DB2-BD59-A6C34878D82A}">
-                    <a16:rowId xmlns:a16="http://schemas.microsoft.com/office/drawing/2014/main" val="10015"/>
+                    <a16:rowId xmlns:a16="http://schemas.microsoft.com/office/drawing/2014/main" xmlns="" val="10015"/>
                   </a:ext>
                 </a:extLst>
               </a:tr>
@@ -11025,14 +11048,13 @@
                         <a:rPr lang="en-US" sz="1400" baseline="0" dirty="0" smtClean="0"/>
                         <a:t>BP=MEM[SP++]</a:t>
                       </a:r>
-                      <a:endParaRPr lang="en-US" sz="1400" baseline="0" dirty="0" smtClean="0"/>
                     </a:p>
                   </a:txBody>
                   <a:tcPr/>
                 </a:tc>
                 <a:extLst>
                   <a:ext uri="{0D108BD9-81ED-4DB2-BD59-A6C34878D82A}">
-                    <a16:rowId xmlns:a16="http://schemas.microsoft.com/office/drawing/2014/main" val="3909000853"/>
+                    <a16:rowId xmlns:a16="http://schemas.microsoft.com/office/drawing/2014/main" xmlns="" val="3909000853"/>
                   </a:ext>
                 </a:extLst>
               </a:tr>
@@ -11105,28 +11127,28 @@
                 <a:gridCol w="1295400">
                   <a:extLst>
                     <a:ext uri="{9D8B030D-6E8A-4147-A177-3AD203B41FA5}">
-                      <a16:colId xmlns:a16="http://schemas.microsoft.com/office/drawing/2014/main" val="20000"/>
+                      <a16:colId xmlns:a16="http://schemas.microsoft.com/office/drawing/2014/main" xmlns="" val="20000"/>
                     </a:ext>
                   </a:extLst>
                 </a:gridCol>
                 <a:gridCol w="1295400">
                   <a:extLst>
                     <a:ext uri="{9D8B030D-6E8A-4147-A177-3AD203B41FA5}">
-                      <a16:colId xmlns:a16="http://schemas.microsoft.com/office/drawing/2014/main" val="20001"/>
+                      <a16:colId xmlns:a16="http://schemas.microsoft.com/office/drawing/2014/main" xmlns="" val="20001"/>
                     </a:ext>
                   </a:extLst>
                 </a:gridCol>
                 <a:gridCol w="2133600">
                   <a:extLst>
                     <a:ext uri="{9D8B030D-6E8A-4147-A177-3AD203B41FA5}">
-                      <a16:colId xmlns:a16="http://schemas.microsoft.com/office/drawing/2014/main" val="20002"/>
+                      <a16:colId xmlns:a16="http://schemas.microsoft.com/office/drawing/2014/main" xmlns="" val="20002"/>
                     </a:ext>
                   </a:extLst>
                 </a:gridCol>
                 <a:gridCol w="3581401">
                   <a:extLst>
                     <a:ext uri="{9D8B030D-6E8A-4147-A177-3AD203B41FA5}">
-                      <a16:colId xmlns:a16="http://schemas.microsoft.com/office/drawing/2014/main" val="20003"/>
+                      <a16:colId xmlns:a16="http://schemas.microsoft.com/office/drawing/2014/main" xmlns="" val="20003"/>
                     </a:ext>
                   </a:extLst>
                 </a:gridCol>
@@ -11190,7 +11212,7 @@
                 </a:tc>
                 <a:extLst>
                   <a:ext uri="{0D108BD9-81ED-4DB2-BD59-A6C34878D82A}">
-                    <a16:rowId xmlns:a16="http://schemas.microsoft.com/office/drawing/2014/main" val="10000"/>
+                    <a16:rowId xmlns:a16="http://schemas.microsoft.com/office/drawing/2014/main" xmlns="" val="10000"/>
                   </a:ext>
                 </a:extLst>
               </a:tr>
@@ -11253,7 +11275,7 @@
                 </a:tc>
                 <a:extLst>
                   <a:ext uri="{0D108BD9-81ED-4DB2-BD59-A6C34878D82A}">
-                    <a16:rowId xmlns:a16="http://schemas.microsoft.com/office/drawing/2014/main" val="10001"/>
+                    <a16:rowId xmlns:a16="http://schemas.microsoft.com/office/drawing/2014/main" xmlns="" val="10001"/>
                   </a:ext>
                 </a:extLst>
               </a:tr>
@@ -11316,7 +11338,7 @@
                 </a:tc>
                 <a:extLst>
                   <a:ext uri="{0D108BD9-81ED-4DB2-BD59-A6C34878D82A}">
-                    <a16:rowId xmlns:a16="http://schemas.microsoft.com/office/drawing/2014/main" val="10002"/>
+                    <a16:rowId xmlns:a16="http://schemas.microsoft.com/office/drawing/2014/main" xmlns="" val="10002"/>
                   </a:ext>
                 </a:extLst>
               </a:tr>
@@ -11379,7 +11401,7 @@
                 </a:tc>
                 <a:extLst>
                   <a:ext uri="{0D108BD9-81ED-4DB2-BD59-A6C34878D82A}">
-                    <a16:rowId xmlns:a16="http://schemas.microsoft.com/office/drawing/2014/main" val="10003"/>
+                    <a16:rowId xmlns:a16="http://schemas.microsoft.com/office/drawing/2014/main" xmlns="" val="10003"/>
                   </a:ext>
                 </a:extLst>
               </a:tr>
@@ -11442,7 +11464,7 @@
                 </a:tc>
                 <a:extLst>
                   <a:ext uri="{0D108BD9-81ED-4DB2-BD59-A6C34878D82A}">
-                    <a16:rowId xmlns:a16="http://schemas.microsoft.com/office/drawing/2014/main" val="10004"/>
+                    <a16:rowId xmlns:a16="http://schemas.microsoft.com/office/drawing/2014/main" xmlns="" val="10004"/>
                   </a:ext>
                 </a:extLst>
               </a:tr>
@@ -11505,7 +11527,7 @@
                 </a:tc>
                 <a:extLst>
                   <a:ext uri="{0D108BD9-81ED-4DB2-BD59-A6C34878D82A}">
-                    <a16:rowId xmlns:a16="http://schemas.microsoft.com/office/drawing/2014/main" val="10005"/>
+                    <a16:rowId xmlns:a16="http://schemas.microsoft.com/office/drawing/2014/main" xmlns="" val="10005"/>
                   </a:ext>
                 </a:extLst>
               </a:tr>
@@ -11568,7 +11590,7 @@
                 </a:tc>
                 <a:extLst>
                   <a:ext uri="{0D108BD9-81ED-4DB2-BD59-A6C34878D82A}">
-                    <a16:rowId xmlns:a16="http://schemas.microsoft.com/office/drawing/2014/main" val="10006"/>
+                    <a16:rowId xmlns:a16="http://schemas.microsoft.com/office/drawing/2014/main" xmlns="" val="10006"/>
                   </a:ext>
                 </a:extLst>
               </a:tr>
@@ -11631,7 +11653,7 @@
                 </a:tc>
                 <a:extLst>
                   <a:ext uri="{0D108BD9-81ED-4DB2-BD59-A6C34878D82A}">
-                    <a16:rowId xmlns:a16="http://schemas.microsoft.com/office/drawing/2014/main" val="10007"/>
+                    <a16:rowId xmlns:a16="http://schemas.microsoft.com/office/drawing/2014/main" xmlns="" val="10007"/>
                   </a:ext>
                 </a:extLst>
               </a:tr>
@@ -11694,7 +11716,7 @@
                 </a:tc>
                 <a:extLst>
                   <a:ext uri="{0D108BD9-81ED-4DB2-BD59-A6C34878D82A}">
-                    <a16:rowId xmlns:a16="http://schemas.microsoft.com/office/drawing/2014/main" val="10008"/>
+                    <a16:rowId xmlns:a16="http://schemas.microsoft.com/office/drawing/2014/main" xmlns="" val="10008"/>
                   </a:ext>
                 </a:extLst>
               </a:tr>
@@ -11757,7 +11779,7 @@
                 </a:tc>
                 <a:extLst>
                   <a:ext uri="{0D108BD9-81ED-4DB2-BD59-A6C34878D82A}">
-                    <a16:rowId xmlns:a16="http://schemas.microsoft.com/office/drawing/2014/main" val="10009"/>
+                    <a16:rowId xmlns:a16="http://schemas.microsoft.com/office/drawing/2014/main" xmlns="" val="10009"/>
                   </a:ext>
                 </a:extLst>
               </a:tr>
@@ -11808,7 +11830,7 @@
                 </a:tc>
                 <a:extLst>
                   <a:ext uri="{0D108BD9-81ED-4DB2-BD59-A6C34878D82A}">
-                    <a16:rowId xmlns:a16="http://schemas.microsoft.com/office/drawing/2014/main" val="10010"/>
+                    <a16:rowId xmlns:a16="http://schemas.microsoft.com/office/drawing/2014/main" xmlns="" val="10010"/>
                   </a:ext>
                 </a:extLst>
               </a:tr>
@@ -11859,7 +11881,7 @@
                 </a:tc>
                 <a:extLst>
                   <a:ext uri="{0D108BD9-81ED-4DB2-BD59-A6C34878D82A}">
-                    <a16:rowId xmlns:a16="http://schemas.microsoft.com/office/drawing/2014/main" val="10011"/>
+                    <a16:rowId xmlns:a16="http://schemas.microsoft.com/office/drawing/2014/main" xmlns="" val="10011"/>
                   </a:ext>
                 </a:extLst>
               </a:tr>
@@ -11910,7 +11932,7 @@
                 </a:tc>
                 <a:extLst>
                   <a:ext uri="{0D108BD9-81ED-4DB2-BD59-A6C34878D82A}">
-                    <a16:rowId xmlns:a16="http://schemas.microsoft.com/office/drawing/2014/main" val="10012"/>
+                    <a16:rowId xmlns:a16="http://schemas.microsoft.com/office/drawing/2014/main" xmlns="" val="10012"/>
                   </a:ext>
                 </a:extLst>
               </a:tr>
@@ -11961,7 +11983,7 @@
                 </a:tc>
                 <a:extLst>
                   <a:ext uri="{0D108BD9-81ED-4DB2-BD59-A6C34878D82A}">
-                    <a16:rowId xmlns:a16="http://schemas.microsoft.com/office/drawing/2014/main" val="10013"/>
+                    <a16:rowId xmlns:a16="http://schemas.microsoft.com/office/drawing/2014/main" xmlns="" val="10013"/>
                   </a:ext>
                 </a:extLst>
               </a:tr>
@@ -12012,7 +12034,7 @@
                 </a:tc>
                 <a:extLst>
                   <a:ext uri="{0D108BD9-81ED-4DB2-BD59-A6C34878D82A}">
-                    <a16:rowId xmlns:a16="http://schemas.microsoft.com/office/drawing/2014/main" val="10014"/>
+                    <a16:rowId xmlns:a16="http://schemas.microsoft.com/office/drawing/2014/main" xmlns="" val="10014"/>
                   </a:ext>
                 </a:extLst>
               </a:tr>
@@ -12063,7 +12085,7 @@
                 </a:tc>
                 <a:extLst>
                   <a:ext uri="{0D108BD9-81ED-4DB2-BD59-A6C34878D82A}">
-                    <a16:rowId xmlns:a16="http://schemas.microsoft.com/office/drawing/2014/main" val="10015"/>
+                    <a16:rowId xmlns:a16="http://schemas.microsoft.com/office/drawing/2014/main" xmlns="" val="10015"/>
                   </a:ext>
                 </a:extLst>
               </a:tr>
@@ -12114,7 +12136,7 @@
                 </a:tc>
                 <a:extLst>
                   <a:ext uri="{0D108BD9-81ED-4DB2-BD59-A6C34878D82A}">
-                    <a16:rowId xmlns:a16="http://schemas.microsoft.com/office/drawing/2014/main" val="3909000853"/>
+                    <a16:rowId xmlns:a16="http://schemas.microsoft.com/office/drawing/2014/main" xmlns="" val="3909000853"/>
                   </a:ext>
                 </a:extLst>
               </a:tr>

</xml_diff>

<commit_message>
updated instruction set descriptions
</commit_message>
<xml_diff>
--- a/Microarchitecture.pptx
+++ b/Microarchitecture.pptx
@@ -111,7 +111,7 @@
   </p:defaultTextStyle>
   <p:extLst>
     <p:ext uri="{EFAFB233-063F-42B5-8137-9DF3F51BA10A}">
-      <p15:sldGuideLst xmlns:p15="http://schemas.microsoft.com/office/powerpoint/2012/main" xmlns="">
+      <p15:sldGuideLst xmlns="" xmlns:p15="http://schemas.microsoft.com/office/powerpoint/2012/main">
         <p15:guide id="1" orient="horz" pos="2160">
           <p15:clr>
             <a:srgbClr val="A4A3A4"/>
@@ -309,7 +309,7 @@
           <a:p>
             <a:fld id="{267D5C1A-8198-4C2A-9AE2-AA2B1DDE4025}" type="datetimeFigureOut">
               <a:rPr lang="en-US" smtClean="0"/>
-              <a:t>3/6/2018</a:t>
+              <a:t>3/8/2018</a:t>
             </a:fld>
             <a:endParaRPr lang="en-US"/>
           </a:p>
@@ -479,7 +479,7 @@
           <a:p>
             <a:fld id="{267D5C1A-8198-4C2A-9AE2-AA2B1DDE4025}" type="datetimeFigureOut">
               <a:rPr lang="en-US" smtClean="0"/>
-              <a:t>3/6/2018</a:t>
+              <a:t>3/8/2018</a:t>
             </a:fld>
             <a:endParaRPr lang="en-US"/>
           </a:p>
@@ -659,7 +659,7 @@
           <a:p>
             <a:fld id="{267D5C1A-8198-4C2A-9AE2-AA2B1DDE4025}" type="datetimeFigureOut">
               <a:rPr lang="en-US" smtClean="0"/>
-              <a:t>3/6/2018</a:t>
+              <a:t>3/8/2018</a:t>
             </a:fld>
             <a:endParaRPr lang="en-US"/>
           </a:p>
@@ -829,7 +829,7 @@
           <a:p>
             <a:fld id="{267D5C1A-8198-4C2A-9AE2-AA2B1DDE4025}" type="datetimeFigureOut">
               <a:rPr lang="en-US" smtClean="0"/>
-              <a:t>3/6/2018</a:t>
+              <a:t>3/8/2018</a:t>
             </a:fld>
             <a:endParaRPr lang="en-US"/>
           </a:p>
@@ -1075,7 +1075,7 @@
           <a:p>
             <a:fld id="{267D5C1A-8198-4C2A-9AE2-AA2B1DDE4025}" type="datetimeFigureOut">
               <a:rPr lang="en-US" smtClean="0"/>
-              <a:t>3/6/2018</a:t>
+              <a:t>3/8/2018</a:t>
             </a:fld>
             <a:endParaRPr lang="en-US"/>
           </a:p>
@@ -1363,7 +1363,7 @@
           <a:p>
             <a:fld id="{267D5C1A-8198-4C2A-9AE2-AA2B1DDE4025}" type="datetimeFigureOut">
               <a:rPr lang="en-US" smtClean="0"/>
-              <a:t>3/6/2018</a:t>
+              <a:t>3/8/2018</a:t>
             </a:fld>
             <a:endParaRPr lang="en-US"/>
           </a:p>
@@ -1785,7 +1785,7 @@
           <a:p>
             <a:fld id="{267D5C1A-8198-4C2A-9AE2-AA2B1DDE4025}" type="datetimeFigureOut">
               <a:rPr lang="en-US" smtClean="0"/>
-              <a:t>3/6/2018</a:t>
+              <a:t>3/8/2018</a:t>
             </a:fld>
             <a:endParaRPr lang="en-US"/>
           </a:p>
@@ -1903,7 +1903,7 @@
           <a:p>
             <a:fld id="{267D5C1A-8198-4C2A-9AE2-AA2B1DDE4025}" type="datetimeFigureOut">
               <a:rPr lang="en-US" smtClean="0"/>
-              <a:t>3/6/2018</a:t>
+              <a:t>3/8/2018</a:t>
             </a:fld>
             <a:endParaRPr lang="en-US"/>
           </a:p>
@@ -1998,7 +1998,7 @@
           <a:p>
             <a:fld id="{267D5C1A-8198-4C2A-9AE2-AA2B1DDE4025}" type="datetimeFigureOut">
               <a:rPr lang="en-US" smtClean="0"/>
-              <a:t>3/6/2018</a:t>
+              <a:t>3/8/2018</a:t>
             </a:fld>
             <a:endParaRPr lang="en-US"/>
           </a:p>
@@ -2275,7 +2275,7 @@
           <a:p>
             <a:fld id="{267D5C1A-8198-4C2A-9AE2-AA2B1DDE4025}" type="datetimeFigureOut">
               <a:rPr lang="en-US" smtClean="0"/>
-              <a:t>3/6/2018</a:t>
+              <a:t>3/8/2018</a:t>
             </a:fld>
             <a:endParaRPr lang="en-US"/>
           </a:p>
@@ -2528,7 +2528,7 @@
           <a:p>
             <a:fld id="{267D5C1A-8198-4C2A-9AE2-AA2B1DDE4025}" type="datetimeFigureOut">
               <a:rPr lang="en-US" smtClean="0"/>
-              <a:t>3/6/2018</a:t>
+              <a:t>3/8/2018</a:t>
             </a:fld>
             <a:endParaRPr lang="en-US"/>
           </a:p>
@@ -2741,7 +2741,7 @@
           <a:p>
             <a:fld id="{267D5C1A-8198-4C2A-9AE2-AA2B1DDE4025}" type="datetimeFigureOut">
               <a:rPr lang="en-US" smtClean="0"/>
-              <a:t>3/6/2018</a:t>
+              <a:t>3/8/2018</a:t>
             </a:fld>
             <a:endParaRPr lang="en-US"/>
           </a:p>
@@ -7558,28 +7558,28 @@
                 <a:gridCol w="1295400">
                   <a:extLst>
                     <a:ext uri="{9D8B030D-6E8A-4147-A177-3AD203B41FA5}">
-                      <a16:colId xmlns:a16="http://schemas.microsoft.com/office/drawing/2014/main" xmlns="" val="20000"/>
+                      <a16:colId xmlns="" xmlns:a16="http://schemas.microsoft.com/office/drawing/2014/main" val="20000"/>
                     </a:ext>
                   </a:extLst>
                 </a:gridCol>
                 <a:gridCol w="1295400">
                   <a:extLst>
                     <a:ext uri="{9D8B030D-6E8A-4147-A177-3AD203B41FA5}">
-                      <a16:colId xmlns:a16="http://schemas.microsoft.com/office/drawing/2014/main" xmlns="" val="20001"/>
+                      <a16:colId xmlns="" xmlns:a16="http://schemas.microsoft.com/office/drawing/2014/main" val="20001"/>
                     </a:ext>
                   </a:extLst>
                 </a:gridCol>
                 <a:gridCol w="1977391">
                   <a:extLst>
                     <a:ext uri="{9D8B030D-6E8A-4147-A177-3AD203B41FA5}">
-                      <a16:colId xmlns:a16="http://schemas.microsoft.com/office/drawing/2014/main" xmlns="" val="20002"/>
+                      <a16:colId xmlns="" xmlns:a16="http://schemas.microsoft.com/office/drawing/2014/main" val="20002"/>
                     </a:ext>
                   </a:extLst>
                 </a:gridCol>
                 <a:gridCol w="3737610">
                   <a:extLst>
                     <a:ext uri="{9D8B030D-6E8A-4147-A177-3AD203B41FA5}">
-                      <a16:colId xmlns:a16="http://schemas.microsoft.com/office/drawing/2014/main" xmlns="" val="20003"/>
+                      <a16:colId xmlns="" xmlns:a16="http://schemas.microsoft.com/office/drawing/2014/main" val="20003"/>
                     </a:ext>
                   </a:extLst>
                 </a:gridCol>
@@ -7643,7 +7643,7 @@
                 </a:tc>
                 <a:extLst>
                   <a:ext uri="{0D108BD9-81ED-4DB2-BD59-A6C34878D82A}">
-                    <a16:rowId xmlns:a16="http://schemas.microsoft.com/office/drawing/2014/main" xmlns="" val="10000"/>
+                    <a16:rowId xmlns="" xmlns:a16="http://schemas.microsoft.com/office/drawing/2014/main" val="10000"/>
                   </a:ext>
                 </a:extLst>
               </a:tr>
@@ -7710,7 +7710,7 @@
                 </a:tc>
                 <a:extLst>
                   <a:ext uri="{0D108BD9-81ED-4DB2-BD59-A6C34878D82A}">
-                    <a16:rowId xmlns:a16="http://schemas.microsoft.com/office/drawing/2014/main" xmlns="" val="10001"/>
+                    <a16:rowId xmlns="" xmlns:a16="http://schemas.microsoft.com/office/drawing/2014/main" val="10001"/>
                   </a:ext>
                 </a:extLst>
               </a:tr>
@@ -7773,7 +7773,7 @@
                 </a:tc>
                 <a:extLst>
                   <a:ext uri="{0D108BD9-81ED-4DB2-BD59-A6C34878D82A}">
-                    <a16:rowId xmlns:a16="http://schemas.microsoft.com/office/drawing/2014/main" xmlns="" val="10002"/>
+                    <a16:rowId xmlns="" xmlns:a16="http://schemas.microsoft.com/office/drawing/2014/main" val="10002"/>
                   </a:ext>
                 </a:extLst>
               </a:tr>
@@ -7840,7 +7840,7 @@
                 </a:tc>
                 <a:extLst>
                   <a:ext uri="{0D108BD9-81ED-4DB2-BD59-A6C34878D82A}">
-                    <a16:rowId xmlns:a16="http://schemas.microsoft.com/office/drawing/2014/main" xmlns="" val="10003"/>
+                    <a16:rowId xmlns="" xmlns:a16="http://schemas.microsoft.com/office/drawing/2014/main" val="10003"/>
                   </a:ext>
                 </a:extLst>
               </a:tr>
@@ -7907,7 +7907,7 @@
                 </a:tc>
                 <a:extLst>
                   <a:ext uri="{0D108BD9-81ED-4DB2-BD59-A6C34878D82A}">
-                    <a16:rowId xmlns:a16="http://schemas.microsoft.com/office/drawing/2014/main" xmlns="" val="10004"/>
+                    <a16:rowId xmlns="" xmlns:a16="http://schemas.microsoft.com/office/drawing/2014/main" val="10004"/>
                   </a:ext>
                 </a:extLst>
               </a:tr>
@@ -7974,7 +7974,7 @@
                 </a:tc>
                 <a:extLst>
                   <a:ext uri="{0D108BD9-81ED-4DB2-BD59-A6C34878D82A}">
-                    <a16:rowId xmlns:a16="http://schemas.microsoft.com/office/drawing/2014/main" xmlns="" val="10005"/>
+                    <a16:rowId xmlns="" xmlns:a16="http://schemas.microsoft.com/office/drawing/2014/main" val="10005"/>
                   </a:ext>
                 </a:extLst>
               </a:tr>
@@ -8041,7 +8041,7 @@
                 </a:tc>
                 <a:extLst>
                   <a:ext uri="{0D108BD9-81ED-4DB2-BD59-A6C34878D82A}">
-                    <a16:rowId xmlns:a16="http://schemas.microsoft.com/office/drawing/2014/main" xmlns="" val="10006"/>
+                    <a16:rowId xmlns="" xmlns:a16="http://schemas.microsoft.com/office/drawing/2014/main" val="10006"/>
                   </a:ext>
                 </a:extLst>
               </a:tr>
@@ -8111,7 +8111,7 @@
                 </a:tc>
                 <a:extLst>
                   <a:ext uri="{0D108BD9-81ED-4DB2-BD59-A6C34878D82A}">
-                    <a16:rowId xmlns:a16="http://schemas.microsoft.com/office/drawing/2014/main" xmlns="" val="10007"/>
+                    <a16:rowId xmlns="" xmlns:a16="http://schemas.microsoft.com/office/drawing/2014/main" val="10007"/>
                   </a:ext>
                 </a:extLst>
               </a:tr>
@@ -8173,7 +8173,7 @@
                 </a:tc>
                 <a:extLst>
                   <a:ext uri="{0D108BD9-81ED-4DB2-BD59-A6C34878D82A}">
-                    <a16:rowId xmlns:a16="http://schemas.microsoft.com/office/drawing/2014/main" xmlns="" val="10008"/>
+                    <a16:rowId xmlns="" xmlns:a16="http://schemas.microsoft.com/office/drawing/2014/main" val="10008"/>
                   </a:ext>
                 </a:extLst>
               </a:tr>
@@ -8235,7 +8235,7 @@
                 </a:tc>
                 <a:extLst>
                   <a:ext uri="{0D108BD9-81ED-4DB2-BD59-A6C34878D82A}">
-                    <a16:rowId xmlns:a16="http://schemas.microsoft.com/office/drawing/2014/main" xmlns="" val="10009"/>
+                    <a16:rowId xmlns="" xmlns:a16="http://schemas.microsoft.com/office/drawing/2014/main" val="10009"/>
                   </a:ext>
                 </a:extLst>
               </a:tr>
@@ -8297,7 +8297,7 @@
                 </a:tc>
                 <a:extLst>
                   <a:ext uri="{0D108BD9-81ED-4DB2-BD59-A6C34878D82A}">
-                    <a16:rowId xmlns:a16="http://schemas.microsoft.com/office/drawing/2014/main" xmlns="" val="10010"/>
+                    <a16:rowId xmlns="" xmlns:a16="http://schemas.microsoft.com/office/drawing/2014/main" val="10010"/>
                   </a:ext>
                 </a:extLst>
               </a:tr>
@@ -8359,7 +8359,7 @@
                 </a:tc>
                 <a:extLst>
                   <a:ext uri="{0D108BD9-81ED-4DB2-BD59-A6C34878D82A}">
-                    <a16:rowId xmlns:a16="http://schemas.microsoft.com/office/drawing/2014/main" xmlns="" val="10011"/>
+                    <a16:rowId xmlns="" xmlns:a16="http://schemas.microsoft.com/office/drawing/2014/main" val="10011"/>
                   </a:ext>
                 </a:extLst>
               </a:tr>
@@ -8421,7 +8421,7 @@
                 </a:tc>
                 <a:extLst>
                   <a:ext uri="{0D108BD9-81ED-4DB2-BD59-A6C34878D82A}">
-                    <a16:rowId xmlns:a16="http://schemas.microsoft.com/office/drawing/2014/main" xmlns="" val="10012"/>
+                    <a16:rowId xmlns="" xmlns:a16="http://schemas.microsoft.com/office/drawing/2014/main" val="10012"/>
                   </a:ext>
                 </a:extLst>
               </a:tr>
@@ -8483,7 +8483,7 @@
                 </a:tc>
                 <a:extLst>
                   <a:ext uri="{0D108BD9-81ED-4DB2-BD59-A6C34878D82A}">
-                    <a16:rowId xmlns:a16="http://schemas.microsoft.com/office/drawing/2014/main" xmlns="" val="10013"/>
+                    <a16:rowId xmlns="" xmlns:a16="http://schemas.microsoft.com/office/drawing/2014/main" val="10013"/>
                   </a:ext>
                 </a:extLst>
               </a:tr>
@@ -8549,7 +8549,7 @@
                 </a:tc>
                 <a:extLst>
                   <a:ext uri="{0D108BD9-81ED-4DB2-BD59-A6C34878D82A}">
-                    <a16:rowId xmlns:a16="http://schemas.microsoft.com/office/drawing/2014/main" xmlns="" val="10014"/>
+                    <a16:rowId xmlns="" xmlns:a16="http://schemas.microsoft.com/office/drawing/2014/main" val="10014"/>
                   </a:ext>
                 </a:extLst>
               </a:tr>
@@ -8611,7 +8611,7 @@
                 </a:tc>
                 <a:extLst>
                   <a:ext uri="{0D108BD9-81ED-4DB2-BD59-A6C34878D82A}">
-                    <a16:rowId xmlns:a16="http://schemas.microsoft.com/office/drawing/2014/main" xmlns="" val="10015"/>
+                    <a16:rowId xmlns="" xmlns:a16="http://schemas.microsoft.com/office/drawing/2014/main" val="10015"/>
                   </a:ext>
                 </a:extLst>
               </a:tr>
@@ -8673,7 +8673,7 @@
                 </a:tc>
                 <a:extLst>
                   <a:ext uri="{0D108BD9-81ED-4DB2-BD59-A6C34878D82A}">
-                    <a16:rowId xmlns:a16="http://schemas.microsoft.com/office/drawing/2014/main" xmlns="" val="10016"/>
+                    <a16:rowId xmlns="" xmlns:a16="http://schemas.microsoft.com/office/drawing/2014/main" val="10016"/>
                   </a:ext>
                 </a:extLst>
               </a:tr>
@@ -8727,7 +8727,7 @@
           <p:nvPr>
             <p:extLst>
               <p:ext uri="{D42A27DB-BD31-4B8C-83A1-F6EECF244321}">
-                <p14:modId xmlns:p14="http://schemas.microsoft.com/office/powerpoint/2010/main" val="4073778697"/>
+                <p14:modId xmlns:p14="http://schemas.microsoft.com/office/powerpoint/2010/main" val="1996432208"/>
               </p:ext>
             </p:extLst>
           </p:nvPr>
@@ -8746,28 +8746,28 @@
                 <a:gridCol w="1295400">
                   <a:extLst>
                     <a:ext uri="{9D8B030D-6E8A-4147-A177-3AD203B41FA5}">
-                      <a16:colId xmlns:a16="http://schemas.microsoft.com/office/drawing/2014/main" xmlns="" val="20000"/>
+                      <a16:colId xmlns="" xmlns:a16="http://schemas.microsoft.com/office/drawing/2014/main" val="20000"/>
                     </a:ext>
                   </a:extLst>
                 </a:gridCol>
                 <a:gridCol w="1295400">
                   <a:extLst>
                     <a:ext uri="{9D8B030D-6E8A-4147-A177-3AD203B41FA5}">
-                      <a16:colId xmlns:a16="http://schemas.microsoft.com/office/drawing/2014/main" xmlns="" val="20001"/>
+                      <a16:colId xmlns="" xmlns:a16="http://schemas.microsoft.com/office/drawing/2014/main" val="20001"/>
                     </a:ext>
                   </a:extLst>
                 </a:gridCol>
                 <a:gridCol w="2133600">
                   <a:extLst>
                     <a:ext uri="{9D8B030D-6E8A-4147-A177-3AD203B41FA5}">
-                      <a16:colId xmlns:a16="http://schemas.microsoft.com/office/drawing/2014/main" xmlns="" val="20002"/>
+                      <a16:colId xmlns="" xmlns:a16="http://schemas.microsoft.com/office/drawing/2014/main" val="20002"/>
                     </a:ext>
                   </a:extLst>
                 </a:gridCol>
                 <a:gridCol w="3581401">
                   <a:extLst>
                     <a:ext uri="{9D8B030D-6E8A-4147-A177-3AD203B41FA5}">
-                      <a16:colId xmlns:a16="http://schemas.microsoft.com/office/drawing/2014/main" xmlns="" val="20003"/>
+                      <a16:colId xmlns="" xmlns:a16="http://schemas.microsoft.com/office/drawing/2014/main" val="20003"/>
                     </a:ext>
                   </a:extLst>
                 </a:gridCol>
@@ -8831,7 +8831,7 @@
                 </a:tc>
                 <a:extLst>
                   <a:ext uri="{0D108BD9-81ED-4DB2-BD59-A6C34878D82A}">
-                    <a16:rowId xmlns:a16="http://schemas.microsoft.com/office/drawing/2014/main" xmlns="" val="10000"/>
+                    <a16:rowId xmlns="" xmlns:a16="http://schemas.microsoft.com/office/drawing/2014/main" val="10000"/>
                   </a:ext>
                 </a:extLst>
               </a:tr>
@@ -8898,7 +8898,7 @@
                 </a:tc>
                 <a:extLst>
                   <a:ext uri="{0D108BD9-81ED-4DB2-BD59-A6C34878D82A}">
-                    <a16:rowId xmlns:a16="http://schemas.microsoft.com/office/drawing/2014/main" xmlns="" val="10001"/>
+                    <a16:rowId xmlns="" xmlns:a16="http://schemas.microsoft.com/office/drawing/2014/main" val="10001"/>
                   </a:ext>
                 </a:extLst>
               </a:tr>
@@ -8961,7 +8961,7 @@
                 </a:tc>
                 <a:extLst>
                   <a:ext uri="{0D108BD9-81ED-4DB2-BD59-A6C34878D82A}">
-                    <a16:rowId xmlns:a16="http://schemas.microsoft.com/office/drawing/2014/main" xmlns="" val="10002"/>
+                    <a16:rowId xmlns="" xmlns:a16="http://schemas.microsoft.com/office/drawing/2014/main" val="10002"/>
                   </a:ext>
                 </a:extLst>
               </a:tr>
@@ -9024,7 +9024,7 @@
                 </a:tc>
                 <a:extLst>
                   <a:ext uri="{0D108BD9-81ED-4DB2-BD59-A6C34878D82A}">
-                    <a16:rowId xmlns:a16="http://schemas.microsoft.com/office/drawing/2014/main" xmlns="" val="10003"/>
+                    <a16:rowId xmlns="" xmlns:a16="http://schemas.microsoft.com/office/drawing/2014/main" val="10003"/>
                   </a:ext>
                 </a:extLst>
               </a:tr>
@@ -9087,7 +9087,7 @@
                 </a:tc>
                 <a:extLst>
                   <a:ext uri="{0D108BD9-81ED-4DB2-BD59-A6C34878D82A}">
-                    <a16:rowId xmlns:a16="http://schemas.microsoft.com/office/drawing/2014/main" xmlns="" val="10004"/>
+                    <a16:rowId xmlns="" xmlns:a16="http://schemas.microsoft.com/office/drawing/2014/main" val="10004"/>
                   </a:ext>
                 </a:extLst>
               </a:tr>
@@ -9150,7 +9150,7 @@
                 </a:tc>
                 <a:extLst>
                   <a:ext uri="{0D108BD9-81ED-4DB2-BD59-A6C34878D82A}">
-                    <a16:rowId xmlns:a16="http://schemas.microsoft.com/office/drawing/2014/main" xmlns="" val="10005"/>
+                    <a16:rowId xmlns="" xmlns:a16="http://schemas.microsoft.com/office/drawing/2014/main" val="10005"/>
                   </a:ext>
                 </a:extLst>
               </a:tr>
@@ -9213,7 +9213,7 @@
                 </a:tc>
                 <a:extLst>
                   <a:ext uri="{0D108BD9-81ED-4DB2-BD59-A6C34878D82A}">
-                    <a16:rowId xmlns:a16="http://schemas.microsoft.com/office/drawing/2014/main" xmlns="" val="10006"/>
+                    <a16:rowId xmlns="" xmlns:a16="http://schemas.microsoft.com/office/drawing/2014/main" val="10006"/>
                   </a:ext>
                 </a:extLst>
               </a:tr>
@@ -9275,7 +9275,7 @@
                 </a:tc>
                 <a:extLst>
                   <a:ext uri="{0D108BD9-81ED-4DB2-BD59-A6C34878D82A}">
-                    <a16:rowId xmlns:a16="http://schemas.microsoft.com/office/drawing/2014/main" xmlns="" val="10007"/>
+                    <a16:rowId xmlns="" xmlns:a16="http://schemas.microsoft.com/office/drawing/2014/main" val="10007"/>
                   </a:ext>
                 </a:extLst>
               </a:tr>
@@ -9337,7 +9337,7 @@
                 </a:tc>
                 <a:extLst>
                   <a:ext uri="{0D108BD9-81ED-4DB2-BD59-A6C34878D82A}">
-                    <a16:rowId xmlns:a16="http://schemas.microsoft.com/office/drawing/2014/main" xmlns="" val="10008"/>
+                    <a16:rowId xmlns="" xmlns:a16="http://schemas.microsoft.com/office/drawing/2014/main" val="10008"/>
                   </a:ext>
                 </a:extLst>
               </a:tr>
@@ -9403,7 +9403,7 @@
                 </a:tc>
                 <a:extLst>
                   <a:ext uri="{0D108BD9-81ED-4DB2-BD59-A6C34878D82A}">
-                    <a16:rowId xmlns:a16="http://schemas.microsoft.com/office/drawing/2014/main" xmlns="" val="10009"/>
+                    <a16:rowId xmlns="" xmlns:a16="http://schemas.microsoft.com/office/drawing/2014/main" val="10009"/>
                   </a:ext>
                 </a:extLst>
               </a:tr>
@@ -9465,7 +9465,7 @@
                 </a:tc>
                 <a:extLst>
                   <a:ext uri="{0D108BD9-81ED-4DB2-BD59-A6C34878D82A}">
-                    <a16:rowId xmlns:a16="http://schemas.microsoft.com/office/drawing/2014/main" xmlns="" val="10010"/>
+                    <a16:rowId xmlns="" xmlns:a16="http://schemas.microsoft.com/office/drawing/2014/main" val="10010"/>
                   </a:ext>
                 </a:extLst>
               </a:tr>
@@ -9527,7 +9527,7 @@
                 </a:tc>
                 <a:extLst>
                   <a:ext uri="{0D108BD9-81ED-4DB2-BD59-A6C34878D82A}">
-                    <a16:rowId xmlns:a16="http://schemas.microsoft.com/office/drawing/2014/main" xmlns="" val="10011"/>
+                    <a16:rowId xmlns="" xmlns:a16="http://schemas.microsoft.com/office/drawing/2014/main" val="10011"/>
                   </a:ext>
                 </a:extLst>
               </a:tr>
@@ -9589,7 +9589,7 @@
                 </a:tc>
                 <a:extLst>
                   <a:ext uri="{0D108BD9-81ED-4DB2-BD59-A6C34878D82A}">
-                    <a16:rowId xmlns:a16="http://schemas.microsoft.com/office/drawing/2014/main" xmlns="" val="10012"/>
+                    <a16:rowId xmlns="" xmlns:a16="http://schemas.microsoft.com/office/drawing/2014/main" val="10012"/>
                   </a:ext>
                 </a:extLst>
               </a:tr>
@@ -9643,19 +9643,20 @@
                     <a:p>
                       <a:r>
                         <a:rPr lang="en-US" sz="1400" baseline="0" dirty="0" smtClean="0"/>
-                        <a:t>TMP=AC-MEM[X];</a:t>
+                        <a:t>TMP=AC-MEM[X];AC=-</a:t>
                       </a:r>
                       <a:r>
                         <a:rPr lang="en-US" sz="1400" baseline="0" dirty="0" smtClean="0"/>
-                        <a:t>AC=-1|0|1</a:t>
-                      </a:r>
+                        <a:t>1|0|1</a:t>
+                      </a:r>
+                      <a:endParaRPr lang="en-US" sz="1400" baseline="0" dirty="0" smtClean="0"/>
                     </a:p>
                   </a:txBody>
                   <a:tcPr/>
                 </a:tc>
                 <a:extLst>
                   <a:ext uri="{0D108BD9-81ED-4DB2-BD59-A6C34878D82A}">
-                    <a16:rowId xmlns:a16="http://schemas.microsoft.com/office/drawing/2014/main" xmlns="" val="10013"/>
+                    <a16:rowId xmlns="" xmlns:a16="http://schemas.microsoft.com/office/drawing/2014/main" val="10013"/>
                   </a:ext>
                 </a:extLst>
               </a:tr>
@@ -9734,7 +9735,7 @@
                 </a:tc>
                 <a:extLst>
                   <a:ext uri="{0D108BD9-81ED-4DB2-BD59-A6C34878D82A}">
-                    <a16:rowId xmlns:a16="http://schemas.microsoft.com/office/drawing/2014/main" xmlns="" val="10014"/>
+                    <a16:rowId xmlns="" xmlns:a16="http://schemas.microsoft.com/office/drawing/2014/main" val="10014"/>
                   </a:ext>
                 </a:extLst>
               </a:tr>
@@ -9796,7 +9797,7 @@
                 </a:tc>
                 <a:extLst>
                   <a:ext uri="{0D108BD9-81ED-4DB2-BD59-A6C34878D82A}">
-                    <a16:rowId xmlns:a16="http://schemas.microsoft.com/office/drawing/2014/main" xmlns="" val="10015"/>
+                    <a16:rowId xmlns="" xmlns:a16="http://schemas.microsoft.com/office/drawing/2014/main" val="10015"/>
                   </a:ext>
                 </a:extLst>
               </a:tr>
@@ -9858,7 +9859,7 @@
                 </a:tc>
                 <a:extLst>
                   <a:ext uri="{0D108BD9-81ED-4DB2-BD59-A6C34878D82A}">
-                    <a16:rowId xmlns:a16="http://schemas.microsoft.com/office/drawing/2014/main" xmlns="" val="785209088"/>
+                    <a16:rowId xmlns="" xmlns:a16="http://schemas.microsoft.com/office/drawing/2014/main" val="785209088"/>
                   </a:ext>
                 </a:extLst>
               </a:tr>
@@ -9931,28 +9932,28 @@
                 <a:gridCol w="1295400">
                   <a:extLst>
                     <a:ext uri="{9D8B030D-6E8A-4147-A177-3AD203B41FA5}">
-                      <a16:colId xmlns:a16="http://schemas.microsoft.com/office/drawing/2014/main" xmlns="" val="20000"/>
+                      <a16:colId xmlns="" xmlns:a16="http://schemas.microsoft.com/office/drawing/2014/main" val="20000"/>
                     </a:ext>
                   </a:extLst>
                 </a:gridCol>
                 <a:gridCol w="1295400">
                   <a:extLst>
                     <a:ext uri="{9D8B030D-6E8A-4147-A177-3AD203B41FA5}">
-                      <a16:colId xmlns:a16="http://schemas.microsoft.com/office/drawing/2014/main" xmlns="" val="20001"/>
+                      <a16:colId xmlns="" xmlns:a16="http://schemas.microsoft.com/office/drawing/2014/main" val="20001"/>
                     </a:ext>
                   </a:extLst>
                 </a:gridCol>
                 <a:gridCol w="2133600">
                   <a:extLst>
                     <a:ext uri="{9D8B030D-6E8A-4147-A177-3AD203B41FA5}">
-                      <a16:colId xmlns:a16="http://schemas.microsoft.com/office/drawing/2014/main" xmlns="" val="20002"/>
+                      <a16:colId xmlns="" xmlns:a16="http://schemas.microsoft.com/office/drawing/2014/main" val="20002"/>
                     </a:ext>
                   </a:extLst>
                 </a:gridCol>
                 <a:gridCol w="3581401">
                   <a:extLst>
                     <a:ext uri="{9D8B030D-6E8A-4147-A177-3AD203B41FA5}">
-                      <a16:colId xmlns:a16="http://schemas.microsoft.com/office/drawing/2014/main" xmlns="" val="20003"/>
+                      <a16:colId xmlns="" xmlns:a16="http://schemas.microsoft.com/office/drawing/2014/main" val="20003"/>
                     </a:ext>
                   </a:extLst>
                 </a:gridCol>
@@ -10016,7 +10017,7 @@
                 </a:tc>
                 <a:extLst>
                   <a:ext uri="{0D108BD9-81ED-4DB2-BD59-A6C34878D82A}">
-                    <a16:rowId xmlns:a16="http://schemas.microsoft.com/office/drawing/2014/main" xmlns="" val="10000"/>
+                    <a16:rowId xmlns="" xmlns:a16="http://schemas.microsoft.com/office/drawing/2014/main" val="10000"/>
                   </a:ext>
                 </a:extLst>
               </a:tr>
@@ -10087,7 +10088,7 @@
                 </a:tc>
                 <a:extLst>
                   <a:ext uri="{0D108BD9-81ED-4DB2-BD59-A6C34878D82A}">
-                    <a16:rowId xmlns:a16="http://schemas.microsoft.com/office/drawing/2014/main" xmlns="" val="10001"/>
+                    <a16:rowId xmlns="" xmlns:a16="http://schemas.microsoft.com/office/drawing/2014/main" val="10001"/>
                   </a:ext>
                 </a:extLst>
               </a:tr>
@@ -10150,7 +10151,7 @@
                 </a:tc>
                 <a:extLst>
                   <a:ext uri="{0D108BD9-81ED-4DB2-BD59-A6C34878D82A}">
-                    <a16:rowId xmlns:a16="http://schemas.microsoft.com/office/drawing/2014/main" xmlns="" val="10002"/>
+                    <a16:rowId xmlns="" xmlns:a16="http://schemas.microsoft.com/office/drawing/2014/main" val="10002"/>
                   </a:ext>
                 </a:extLst>
               </a:tr>
@@ -10217,7 +10218,7 @@
                 </a:tc>
                 <a:extLst>
                   <a:ext uri="{0D108BD9-81ED-4DB2-BD59-A6C34878D82A}">
-                    <a16:rowId xmlns:a16="http://schemas.microsoft.com/office/drawing/2014/main" xmlns="" val="10003"/>
+                    <a16:rowId xmlns="" xmlns:a16="http://schemas.microsoft.com/office/drawing/2014/main" val="10003"/>
                   </a:ext>
                 </a:extLst>
               </a:tr>
@@ -10280,7 +10281,7 @@
                 </a:tc>
                 <a:extLst>
                   <a:ext uri="{0D108BD9-81ED-4DB2-BD59-A6C34878D82A}">
-                    <a16:rowId xmlns:a16="http://schemas.microsoft.com/office/drawing/2014/main" xmlns="" val="10004"/>
+                    <a16:rowId xmlns="" xmlns:a16="http://schemas.microsoft.com/office/drawing/2014/main" val="10004"/>
                   </a:ext>
                 </a:extLst>
               </a:tr>
@@ -10343,7 +10344,7 @@
                 </a:tc>
                 <a:extLst>
                   <a:ext uri="{0D108BD9-81ED-4DB2-BD59-A6C34878D82A}">
-                    <a16:rowId xmlns:a16="http://schemas.microsoft.com/office/drawing/2014/main" xmlns="" val="10005"/>
+                    <a16:rowId xmlns="" xmlns:a16="http://schemas.microsoft.com/office/drawing/2014/main" val="10005"/>
                   </a:ext>
                 </a:extLst>
               </a:tr>
@@ -10406,7 +10407,7 @@
                 </a:tc>
                 <a:extLst>
                   <a:ext uri="{0D108BD9-81ED-4DB2-BD59-A6C34878D82A}">
-                    <a16:rowId xmlns:a16="http://schemas.microsoft.com/office/drawing/2014/main" xmlns="" val="10006"/>
+                    <a16:rowId xmlns="" xmlns:a16="http://schemas.microsoft.com/office/drawing/2014/main" val="10006"/>
                   </a:ext>
                 </a:extLst>
               </a:tr>
@@ -10469,7 +10470,7 @@
                 </a:tc>
                 <a:extLst>
                   <a:ext uri="{0D108BD9-81ED-4DB2-BD59-A6C34878D82A}">
-                    <a16:rowId xmlns:a16="http://schemas.microsoft.com/office/drawing/2014/main" xmlns="" val="10007"/>
+                    <a16:rowId xmlns="" xmlns:a16="http://schemas.microsoft.com/office/drawing/2014/main" val="10007"/>
                   </a:ext>
                 </a:extLst>
               </a:tr>
@@ -10536,7 +10537,7 @@
                 </a:tc>
                 <a:extLst>
                   <a:ext uri="{0D108BD9-81ED-4DB2-BD59-A6C34878D82A}">
-                    <a16:rowId xmlns:a16="http://schemas.microsoft.com/office/drawing/2014/main" xmlns="" val="10008"/>
+                    <a16:rowId xmlns="" xmlns:a16="http://schemas.microsoft.com/office/drawing/2014/main" val="10008"/>
                   </a:ext>
                 </a:extLst>
               </a:tr>
@@ -10599,7 +10600,7 @@
                 </a:tc>
                 <a:extLst>
                   <a:ext uri="{0D108BD9-81ED-4DB2-BD59-A6C34878D82A}">
-                    <a16:rowId xmlns:a16="http://schemas.microsoft.com/office/drawing/2014/main" xmlns="" val="10009"/>
+                    <a16:rowId xmlns="" xmlns:a16="http://schemas.microsoft.com/office/drawing/2014/main" val="10009"/>
                   </a:ext>
                 </a:extLst>
               </a:tr>
@@ -10662,7 +10663,7 @@
                 </a:tc>
                 <a:extLst>
                   <a:ext uri="{0D108BD9-81ED-4DB2-BD59-A6C34878D82A}">
-                    <a16:rowId xmlns:a16="http://schemas.microsoft.com/office/drawing/2014/main" xmlns="" val="10010"/>
+                    <a16:rowId xmlns="" xmlns:a16="http://schemas.microsoft.com/office/drawing/2014/main" val="10010"/>
                   </a:ext>
                 </a:extLst>
               </a:tr>
@@ -10725,7 +10726,7 @@
                 </a:tc>
                 <a:extLst>
                   <a:ext uri="{0D108BD9-81ED-4DB2-BD59-A6C34878D82A}">
-                    <a16:rowId xmlns:a16="http://schemas.microsoft.com/office/drawing/2014/main" xmlns="" val="10011"/>
+                    <a16:rowId xmlns="" xmlns:a16="http://schemas.microsoft.com/office/drawing/2014/main" val="10011"/>
                   </a:ext>
                 </a:extLst>
               </a:tr>
@@ -10792,7 +10793,7 @@
                 </a:tc>
                 <a:extLst>
                   <a:ext uri="{0D108BD9-81ED-4DB2-BD59-A6C34878D82A}">
-                    <a16:rowId xmlns:a16="http://schemas.microsoft.com/office/drawing/2014/main" xmlns="" val="10012"/>
+                    <a16:rowId xmlns="" xmlns:a16="http://schemas.microsoft.com/office/drawing/2014/main" val="10012"/>
                   </a:ext>
                 </a:extLst>
               </a:tr>
@@ -10863,7 +10864,7 @@
                 </a:tc>
                 <a:extLst>
                   <a:ext uri="{0D108BD9-81ED-4DB2-BD59-A6C34878D82A}">
-                    <a16:rowId xmlns:a16="http://schemas.microsoft.com/office/drawing/2014/main" xmlns="" val="10013"/>
+                    <a16:rowId xmlns="" xmlns:a16="http://schemas.microsoft.com/office/drawing/2014/main" val="10013"/>
                   </a:ext>
                 </a:extLst>
               </a:tr>
@@ -10930,7 +10931,7 @@
                 </a:tc>
                 <a:extLst>
                   <a:ext uri="{0D108BD9-81ED-4DB2-BD59-A6C34878D82A}">
-                    <a16:rowId xmlns:a16="http://schemas.microsoft.com/office/drawing/2014/main" xmlns="" val="10014"/>
+                    <a16:rowId xmlns="" xmlns:a16="http://schemas.microsoft.com/office/drawing/2014/main" val="10014"/>
                   </a:ext>
                 </a:extLst>
               </a:tr>
@@ -10992,7 +10993,7 @@
                 </a:tc>
                 <a:extLst>
                   <a:ext uri="{0D108BD9-81ED-4DB2-BD59-A6C34878D82A}">
-                    <a16:rowId xmlns:a16="http://schemas.microsoft.com/office/drawing/2014/main" xmlns="" val="10015"/>
+                    <a16:rowId xmlns="" xmlns:a16="http://schemas.microsoft.com/office/drawing/2014/main" val="10015"/>
                   </a:ext>
                 </a:extLst>
               </a:tr>
@@ -11054,7 +11055,7 @@
                 </a:tc>
                 <a:extLst>
                   <a:ext uri="{0D108BD9-81ED-4DB2-BD59-A6C34878D82A}">
-                    <a16:rowId xmlns:a16="http://schemas.microsoft.com/office/drawing/2014/main" xmlns="" val="3909000853"/>
+                    <a16:rowId xmlns="" xmlns:a16="http://schemas.microsoft.com/office/drawing/2014/main" val="3909000853"/>
                   </a:ext>
                 </a:extLst>
               </a:tr>
@@ -11127,28 +11128,28 @@
                 <a:gridCol w="1295400">
                   <a:extLst>
                     <a:ext uri="{9D8B030D-6E8A-4147-A177-3AD203B41FA5}">
-                      <a16:colId xmlns:a16="http://schemas.microsoft.com/office/drawing/2014/main" xmlns="" val="20000"/>
+                      <a16:colId xmlns="" xmlns:a16="http://schemas.microsoft.com/office/drawing/2014/main" val="20000"/>
                     </a:ext>
                   </a:extLst>
                 </a:gridCol>
                 <a:gridCol w="1295400">
                   <a:extLst>
                     <a:ext uri="{9D8B030D-6E8A-4147-A177-3AD203B41FA5}">
-                      <a16:colId xmlns:a16="http://schemas.microsoft.com/office/drawing/2014/main" xmlns="" val="20001"/>
+                      <a16:colId xmlns="" xmlns:a16="http://schemas.microsoft.com/office/drawing/2014/main" val="20001"/>
                     </a:ext>
                   </a:extLst>
                 </a:gridCol>
                 <a:gridCol w="2133600">
                   <a:extLst>
                     <a:ext uri="{9D8B030D-6E8A-4147-A177-3AD203B41FA5}">
-                      <a16:colId xmlns:a16="http://schemas.microsoft.com/office/drawing/2014/main" xmlns="" val="20002"/>
+                      <a16:colId xmlns="" xmlns:a16="http://schemas.microsoft.com/office/drawing/2014/main" val="20002"/>
                     </a:ext>
                   </a:extLst>
                 </a:gridCol>
                 <a:gridCol w="3581401">
                   <a:extLst>
                     <a:ext uri="{9D8B030D-6E8A-4147-A177-3AD203B41FA5}">
-                      <a16:colId xmlns:a16="http://schemas.microsoft.com/office/drawing/2014/main" xmlns="" val="20003"/>
+                      <a16:colId xmlns="" xmlns:a16="http://schemas.microsoft.com/office/drawing/2014/main" val="20003"/>
                     </a:ext>
                   </a:extLst>
                 </a:gridCol>
@@ -11212,7 +11213,7 @@
                 </a:tc>
                 <a:extLst>
                   <a:ext uri="{0D108BD9-81ED-4DB2-BD59-A6C34878D82A}">
-                    <a16:rowId xmlns:a16="http://schemas.microsoft.com/office/drawing/2014/main" xmlns="" val="10000"/>
+                    <a16:rowId xmlns="" xmlns:a16="http://schemas.microsoft.com/office/drawing/2014/main" val="10000"/>
                   </a:ext>
                 </a:extLst>
               </a:tr>
@@ -11275,7 +11276,7 @@
                 </a:tc>
                 <a:extLst>
                   <a:ext uri="{0D108BD9-81ED-4DB2-BD59-A6C34878D82A}">
-                    <a16:rowId xmlns:a16="http://schemas.microsoft.com/office/drawing/2014/main" xmlns="" val="10001"/>
+                    <a16:rowId xmlns="" xmlns:a16="http://schemas.microsoft.com/office/drawing/2014/main" val="10001"/>
                   </a:ext>
                 </a:extLst>
               </a:tr>
@@ -11338,7 +11339,7 @@
                 </a:tc>
                 <a:extLst>
                   <a:ext uri="{0D108BD9-81ED-4DB2-BD59-A6C34878D82A}">
-                    <a16:rowId xmlns:a16="http://schemas.microsoft.com/office/drawing/2014/main" xmlns="" val="10002"/>
+                    <a16:rowId xmlns="" xmlns:a16="http://schemas.microsoft.com/office/drawing/2014/main" val="10002"/>
                   </a:ext>
                 </a:extLst>
               </a:tr>
@@ -11401,7 +11402,7 @@
                 </a:tc>
                 <a:extLst>
                   <a:ext uri="{0D108BD9-81ED-4DB2-BD59-A6C34878D82A}">
-                    <a16:rowId xmlns:a16="http://schemas.microsoft.com/office/drawing/2014/main" xmlns="" val="10003"/>
+                    <a16:rowId xmlns="" xmlns:a16="http://schemas.microsoft.com/office/drawing/2014/main" val="10003"/>
                   </a:ext>
                 </a:extLst>
               </a:tr>
@@ -11464,7 +11465,7 @@
                 </a:tc>
                 <a:extLst>
                   <a:ext uri="{0D108BD9-81ED-4DB2-BD59-A6C34878D82A}">
-                    <a16:rowId xmlns:a16="http://schemas.microsoft.com/office/drawing/2014/main" xmlns="" val="10004"/>
+                    <a16:rowId xmlns="" xmlns:a16="http://schemas.microsoft.com/office/drawing/2014/main" val="10004"/>
                   </a:ext>
                 </a:extLst>
               </a:tr>
@@ -11527,7 +11528,7 @@
                 </a:tc>
                 <a:extLst>
                   <a:ext uri="{0D108BD9-81ED-4DB2-BD59-A6C34878D82A}">
-                    <a16:rowId xmlns:a16="http://schemas.microsoft.com/office/drawing/2014/main" xmlns="" val="10005"/>
+                    <a16:rowId xmlns="" xmlns:a16="http://schemas.microsoft.com/office/drawing/2014/main" val="10005"/>
                   </a:ext>
                 </a:extLst>
               </a:tr>
@@ -11590,7 +11591,7 @@
                 </a:tc>
                 <a:extLst>
                   <a:ext uri="{0D108BD9-81ED-4DB2-BD59-A6C34878D82A}">
-                    <a16:rowId xmlns:a16="http://schemas.microsoft.com/office/drawing/2014/main" xmlns="" val="10006"/>
+                    <a16:rowId xmlns="" xmlns:a16="http://schemas.microsoft.com/office/drawing/2014/main" val="10006"/>
                   </a:ext>
                 </a:extLst>
               </a:tr>
@@ -11653,7 +11654,7 @@
                 </a:tc>
                 <a:extLst>
                   <a:ext uri="{0D108BD9-81ED-4DB2-BD59-A6C34878D82A}">
-                    <a16:rowId xmlns:a16="http://schemas.microsoft.com/office/drawing/2014/main" xmlns="" val="10007"/>
+                    <a16:rowId xmlns="" xmlns:a16="http://schemas.microsoft.com/office/drawing/2014/main" val="10007"/>
                   </a:ext>
                 </a:extLst>
               </a:tr>
@@ -11716,7 +11717,7 @@
                 </a:tc>
                 <a:extLst>
                   <a:ext uri="{0D108BD9-81ED-4DB2-BD59-A6C34878D82A}">
-                    <a16:rowId xmlns:a16="http://schemas.microsoft.com/office/drawing/2014/main" xmlns="" val="10008"/>
+                    <a16:rowId xmlns="" xmlns:a16="http://schemas.microsoft.com/office/drawing/2014/main" val="10008"/>
                   </a:ext>
                 </a:extLst>
               </a:tr>
@@ -11779,7 +11780,7 @@
                 </a:tc>
                 <a:extLst>
                   <a:ext uri="{0D108BD9-81ED-4DB2-BD59-A6C34878D82A}">
-                    <a16:rowId xmlns:a16="http://schemas.microsoft.com/office/drawing/2014/main" xmlns="" val="10009"/>
+                    <a16:rowId xmlns="" xmlns:a16="http://schemas.microsoft.com/office/drawing/2014/main" val="10009"/>
                   </a:ext>
                 </a:extLst>
               </a:tr>
@@ -11830,7 +11831,7 @@
                 </a:tc>
                 <a:extLst>
                   <a:ext uri="{0D108BD9-81ED-4DB2-BD59-A6C34878D82A}">
-                    <a16:rowId xmlns:a16="http://schemas.microsoft.com/office/drawing/2014/main" xmlns="" val="10010"/>
+                    <a16:rowId xmlns="" xmlns:a16="http://schemas.microsoft.com/office/drawing/2014/main" val="10010"/>
                   </a:ext>
                 </a:extLst>
               </a:tr>
@@ -11881,7 +11882,7 @@
                 </a:tc>
                 <a:extLst>
                   <a:ext uri="{0D108BD9-81ED-4DB2-BD59-A6C34878D82A}">
-                    <a16:rowId xmlns:a16="http://schemas.microsoft.com/office/drawing/2014/main" xmlns="" val="10011"/>
+                    <a16:rowId xmlns="" xmlns:a16="http://schemas.microsoft.com/office/drawing/2014/main" val="10011"/>
                   </a:ext>
                 </a:extLst>
               </a:tr>
@@ -11932,7 +11933,7 @@
                 </a:tc>
                 <a:extLst>
                   <a:ext uri="{0D108BD9-81ED-4DB2-BD59-A6C34878D82A}">
-                    <a16:rowId xmlns:a16="http://schemas.microsoft.com/office/drawing/2014/main" xmlns="" val="10012"/>
+                    <a16:rowId xmlns="" xmlns:a16="http://schemas.microsoft.com/office/drawing/2014/main" val="10012"/>
                   </a:ext>
                 </a:extLst>
               </a:tr>
@@ -11983,7 +11984,7 @@
                 </a:tc>
                 <a:extLst>
                   <a:ext uri="{0D108BD9-81ED-4DB2-BD59-A6C34878D82A}">
-                    <a16:rowId xmlns:a16="http://schemas.microsoft.com/office/drawing/2014/main" xmlns="" val="10013"/>
+                    <a16:rowId xmlns="" xmlns:a16="http://schemas.microsoft.com/office/drawing/2014/main" val="10013"/>
                   </a:ext>
                 </a:extLst>
               </a:tr>
@@ -12034,7 +12035,7 @@
                 </a:tc>
                 <a:extLst>
                   <a:ext uri="{0D108BD9-81ED-4DB2-BD59-A6C34878D82A}">
-                    <a16:rowId xmlns:a16="http://schemas.microsoft.com/office/drawing/2014/main" xmlns="" val="10014"/>
+                    <a16:rowId xmlns="" xmlns:a16="http://schemas.microsoft.com/office/drawing/2014/main" val="10014"/>
                   </a:ext>
                 </a:extLst>
               </a:tr>
@@ -12085,7 +12086,7 @@
                 </a:tc>
                 <a:extLst>
                   <a:ext uri="{0D108BD9-81ED-4DB2-BD59-A6C34878D82A}">
-                    <a16:rowId xmlns:a16="http://schemas.microsoft.com/office/drawing/2014/main" xmlns="" val="10015"/>
+                    <a16:rowId xmlns="" xmlns:a16="http://schemas.microsoft.com/office/drawing/2014/main" val="10015"/>
                   </a:ext>
                 </a:extLst>
               </a:tr>
@@ -12136,7 +12137,7 @@
                 </a:tc>
                 <a:extLst>
                   <a:ext uri="{0D108BD9-81ED-4DB2-BD59-A6C34878D82A}">
-                    <a16:rowId xmlns:a16="http://schemas.microsoft.com/office/drawing/2014/main" xmlns="" val="3909000853"/>
+                    <a16:rowId xmlns="" xmlns:a16="http://schemas.microsoft.com/office/drawing/2014/main" val="3909000853"/>
                   </a:ext>
                 </a:extLst>
               </a:tr>

</xml_diff>